<commit_message>
[DOCs] Updated presentation for labwork2
</commit_message>
<xml_diff>
--- a/doc/Labs/LabWork2/LabWork2.pptx
+++ b/doc/Labs/LabWork2/LabWork2.pptx
@@ -18,7 +18,7 @@
     <p:sldId id="273" r:id="rId9"/>
     <p:sldId id="274" r:id="rId10"/>
     <p:sldId id="277" r:id="rId11"/>
-    <p:sldId id="276" r:id="rId12"/>
+    <p:sldId id="286" r:id="rId12"/>
     <p:sldId id="285" r:id="rId13"/>
     <p:sldId id="278" r:id="rId14"/>
   </p:sldIdLst>
@@ -121,7 +121,7 @@
   </p:defaultTextStyle>
   <p:extLst>
     <p:ext uri="{EFAFB233-063F-42B5-8137-9DF3F51BA10A}">
-      <p15:sldGuideLst xmlns:p15="http://schemas.microsoft.com/office/powerpoint/2012/main">
+      <p15:sldGuideLst xmlns="" xmlns:p15="http://schemas.microsoft.com/office/powerpoint/2012/main">
         <p15:guide id="1" orient="horz" pos="2160">
           <p15:clr>
             <a:srgbClr val="A4A3A4"/>
@@ -143,7 +143,7 @@
   <p:cmAuthor id="1" name="Kirill Liubavin" initials="KL" lastIdx="1" clrIdx="0">
     <p:extLst>
       <p:ext uri="{19B8F6BF-5375-455C-9EA6-DF929625EA0E}">
-        <p15:presenceInfo xmlns:p15="http://schemas.microsoft.com/office/powerpoint/2012/main" userId="186205f477ad8eca" providerId="Windows Live"/>
+        <p15:presenceInfo xmlns="" xmlns:p15="http://schemas.microsoft.com/office/powerpoint/2012/main" userId="186205f477ad8eca" providerId="Windows Live"/>
       </p:ext>
     </p:extLst>
   </p:cmAuthor>
@@ -157,7 +157,7 @@
     <p:text/>
     <p:extLst>
       <p:ext uri="{C676402C-5697-4E1C-873F-D02D1690AC5C}">
-        <p15:threadingInfo xmlns:p15="http://schemas.microsoft.com/office/powerpoint/2012/main" timeZoneBias="-180"/>
+        <p15:threadingInfo xmlns="" xmlns:p15="http://schemas.microsoft.com/office/powerpoint/2012/main" timeZoneBias="-180"/>
       </p:ext>
     </p:extLst>
   </p:cm>
@@ -246,7 +246,7 @@
           <a:p>
             <a:fld id="{FA587C48-06B1-4573-B672-8D531DAFB1D4}" type="datetimeFigureOut">
               <a:rPr lang="ru-RU" smtClean="0"/>
-              <a:t>07.02.2022</a:t>
+              <a:t>24.02.2022</a:t>
             </a:fld>
             <a:endParaRPr lang="ru-RU"/>
           </a:p>
@@ -785,7 +785,7 @@
           <a:p>
             <a:fld id="{B4C71EC6-210F-42DE-9C53-41977AD35B3D}" type="datetimeFigureOut">
               <a:rPr lang="ru-RU" smtClean="0"/>
-              <a:t>07.02.2022</a:t>
+              <a:t>24.02.2022</a:t>
             </a:fld>
             <a:endParaRPr lang="ru-RU"/>
           </a:p>
@@ -985,7 +985,7 @@
           <a:p>
             <a:fld id="{B4C71EC6-210F-42DE-9C53-41977AD35B3D}" type="datetimeFigureOut">
               <a:rPr lang="ru-RU" smtClean="0"/>
-              <a:t>07.02.2022</a:t>
+              <a:t>24.02.2022</a:t>
             </a:fld>
             <a:endParaRPr lang="ru-RU"/>
           </a:p>
@@ -1160,7 +1160,7 @@
           <a:p>
             <a:fld id="{B4C71EC6-210F-42DE-9C53-41977AD35B3D}" type="datetimeFigureOut">
               <a:rPr lang="ru-RU" smtClean="0"/>
-              <a:t>07.02.2022</a:t>
+              <a:t>24.02.2022</a:t>
             </a:fld>
             <a:endParaRPr lang="ru-RU"/>
           </a:p>
@@ -1325,7 +1325,7 @@
           <a:p>
             <a:fld id="{B4C71EC6-210F-42DE-9C53-41977AD35B3D}" type="datetimeFigureOut">
               <a:rPr lang="ru-RU" smtClean="0"/>
-              <a:t>07.02.2022</a:t>
+              <a:t>24.02.2022</a:t>
             </a:fld>
             <a:endParaRPr lang="ru-RU"/>
           </a:p>
@@ -1573,7 +1573,7 @@
           <a:p>
             <a:fld id="{B4C71EC6-210F-42DE-9C53-41977AD35B3D}" type="datetimeFigureOut">
               <a:rPr lang="ru-RU" smtClean="0"/>
-              <a:t>07.02.2022</a:t>
+              <a:t>24.02.2022</a:t>
             </a:fld>
             <a:endParaRPr lang="ru-RU"/>
           </a:p>
@@ -1891,7 +1891,7 @@
           <a:p>
             <a:fld id="{B4C71EC6-210F-42DE-9C53-41977AD35B3D}" type="datetimeFigureOut">
               <a:rPr lang="ru-RU" smtClean="0"/>
-              <a:t>07.02.2022</a:t>
+              <a:t>24.02.2022</a:t>
             </a:fld>
             <a:endParaRPr lang="ru-RU"/>
           </a:p>
@@ -2357,7 +2357,7 @@
           <a:p>
             <a:fld id="{B4C71EC6-210F-42DE-9C53-41977AD35B3D}" type="datetimeFigureOut">
               <a:rPr lang="ru-RU" smtClean="0"/>
-              <a:t>07.02.2022</a:t>
+              <a:t>24.02.2022</a:t>
             </a:fld>
             <a:endParaRPr lang="ru-RU"/>
           </a:p>
@@ -2505,7 +2505,7 @@
           <a:p>
             <a:fld id="{B4C71EC6-210F-42DE-9C53-41977AD35B3D}" type="datetimeFigureOut">
               <a:rPr lang="ru-RU" smtClean="0"/>
-              <a:t>07.02.2022</a:t>
+              <a:t>24.02.2022</a:t>
             </a:fld>
             <a:endParaRPr lang="ru-RU"/>
           </a:p>
@@ -2595,7 +2595,7 @@
           <a:p>
             <a:fld id="{B4C71EC6-210F-42DE-9C53-41977AD35B3D}" type="datetimeFigureOut">
               <a:rPr lang="ru-RU" smtClean="0"/>
-              <a:t>07.02.2022</a:t>
+              <a:t>24.02.2022</a:t>
             </a:fld>
             <a:endParaRPr lang="ru-RU"/>
           </a:p>
@@ -2869,7 +2869,7 @@
           <a:p>
             <a:fld id="{B4C71EC6-210F-42DE-9C53-41977AD35B3D}" type="datetimeFigureOut">
               <a:rPr lang="ru-RU" smtClean="0"/>
-              <a:t>07.02.2022</a:t>
+              <a:t>24.02.2022</a:t>
             </a:fld>
             <a:endParaRPr lang="ru-RU"/>
           </a:p>
@@ -3174,7 +3174,7 @@
           <a:p>
             <a:fld id="{B4C71EC6-210F-42DE-9C53-41977AD35B3D}" type="datetimeFigureOut">
               <a:rPr lang="ru-RU" smtClean="0"/>
-              <a:t>07.02.2022</a:t>
+              <a:t>24.02.2022</a:t>
             </a:fld>
             <a:endParaRPr lang="ru-RU"/>
           </a:p>
@@ -3472,7 +3472,7 @@
           <a:p>
             <a:fld id="{B4C71EC6-210F-42DE-9C53-41977AD35B3D}" type="datetimeFigureOut">
               <a:rPr lang="ru-RU" smtClean="0"/>
-              <a:t>07.02.2022</a:t>
+              <a:t>24.02.2022</a:t>
             </a:fld>
             <a:endParaRPr lang="ru-RU"/>
           </a:p>
@@ -3874,7 +3874,7 @@
           <p:cNvPr id="6" name="Заголовок 1">
             <a:extLst>
               <a:ext uri="{FF2B5EF4-FFF2-40B4-BE49-F238E27FC236}">
-                <a16:creationId xmlns:a16="http://schemas.microsoft.com/office/drawing/2014/main" id="{C1A4EEC1-D9E6-417F-9F48-1B5DA26E3F3F}"/>
+                <a16:creationId xmlns="" xmlns:a16="http://schemas.microsoft.com/office/drawing/2014/main" id="{C1A4EEC1-D9E6-417F-9F48-1B5DA26E3F3F}"/>
               </a:ext>
             </a:extLst>
           </p:cNvPr>
@@ -3915,7 +3915,7 @@
           <p:cNvPr id="7" name="Подзаголовок 2">
             <a:extLst>
               <a:ext uri="{FF2B5EF4-FFF2-40B4-BE49-F238E27FC236}">
-                <a16:creationId xmlns:a16="http://schemas.microsoft.com/office/drawing/2014/main" id="{98917299-8BA9-4927-BE73-597D48B99790}"/>
+                <a16:creationId xmlns="" xmlns:a16="http://schemas.microsoft.com/office/drawing/2014/main" id="{98917299-8BA9-4927-BE73-597D48B99790}"/>
               </a:ext>
             </a:extLst>
           </p:cNvPr>
@@ -4323,7 +4323,7 @@
                       <m:sSupPr>
                         <m:ctrlPr>
                           <a:rPr lang="en-US" sz="1800" b="1" i="1" smtClean="0">
-                            <a:latin typeface="Cambria Math" panose="02040503050406030204" pitchFamily="18" charset="0"/>
+                            <a:latin typeface="Cambria Math"/>
                           </a:rPr>
                         </m:ctrlPr>
                       </m:sSupPr>
@@ -4354,7 +4354,7 @@
                       <m:sSupPr>
                         <m:ctrlPr>
                           <a:rPr lang="en-US" sz="1800" b="1" i="1">
-                            <a:latin typeface="Cambria Math" panose="02040503050406030204" pitchFamily="18" charset="0"/>
+                            <a:latin typeface="Cambria Math"/>
                           </a:rPr>
                         </m:ctrlPr>
                       </m:sSupPr>
@@ -4391,7 +4391,7 @@
                       <m:sSupPr>
                         <m:ctrlPr>
                           <a:rPr lang="en-US" sz="1800" b="1" i="1">
-                            <a:latin typeface="Cambria Math" panose="02040503050406030204" pitchFamily="18" charset="0"/>
+                            <a:latin typeface="Cambria Math"/>
                           </a:rPr>
                         </m:ctrlPr>
                       </m:sSupPr>
@@ -4520,6 +4520,13 @@
   <p:clrMapOvr>
     <a:masterClrMapping/>
   </p:clrMapOvr>
+  <p:timing>
+    <p:tnLst>
+      <p:par>
+        <p:cTn id="1" dur="indefinite" restart="never" nodeType="tmRoot"/>
+      </p:par>
+    </p:tnLst>
+  </p:timing>
 </p:sld>
 </file>
 
@@ -4844,8 +4851,8 @@
           </a:p>
         </p:txBody>
       </p:sp>
-      <mc:AlternateContent xmlns:mc="http://schemas.openxmlformats.org/markup-compatibility/2006">
-        <mc:Choice xmlns:a14="http://schemas.microsoft.com/office/drawing/2010/main" Requires="a14">
+      <mc:AlternateContent xmlns:mc="http://schemas.openxmlformats.org/markup-compatibility/2006" xmlns:a14="http://schemas.microsoft.com/office/drawing/2010/main">
+        <mc:Choice Requires="a14">
           <p:sp>
             <p:nvSpPr>
               <p:cNvPr id="12" name="Объект 2"/>
@@ -4885,7 +4892,7 @@
                       <m:sSupPr>
                         <m:ctrlPr>
                           <a:rPr lang="en-US" sz="1800" b="1" i="1" smtClean="0">
-                            <a:latin typeface="Cambria Math" panose="02040503050406030204" pitchFamily="18" charset="0"/>
+                            <a:latin typeface="Cambria Math"/>
                           </a:rPr>
                         </m:ctrlPr>
                       </m:sSupPr>
@@ -4916,7 +4923,7 @@
                       <m:sSupPr>
                         <m:ctrlPr>
                           <a:rPr lang="en-US" sz="1800" b="1" i="1">
-                            <a:latin typeface="Cambria Math" panose="02040503050406030204" pitchFamily="18" charset="0"/>
+                            <a:latin typeface="Cambria Math"/>
                           </a:rPr>
                         </m:ctrlPr>
                       </m:sSupPr>
@@ -4953,7 +4960,7 @@
                       <m:sSupPr>
                         <m:ctrlPr>
                           <a:rPr lang="en-US" sz="1800" b="1" i="1">
-                            <a:latin typeface="Cambria Math" panose="02040503050406030204" pitchFamily="18" charset="0"/>
+                            <a:latin typeface="Cambria Math"/>
                           </a:rPr>
                         </m:ctrlPr>
                       </m:sSupPr>
@@ -4993,7 +5000,7 @@
             </p:txBody>
           </p:sp>
         </mc:Choice>
-        <mc:Fallback>
+        <mc:Fallback xmlns="">
           <p:sp>
             <p:nvSpPr>
               <p:cNvPr id="12" name="Объект 2"/>
@@ -5075,7 +5082,7 @@
     </p:spTree>
     <p:extLst>
       <p:ext uri="{BB962C8B-B14F-4D97-AF65-F5344CB8AC3E}">
-        <p14:creationId xmlns:p14="http://schemas.microsoft.com/office/powerpoint/2010/main" val="1712131030"/>
+        <p14:creationId xmlns:p14="http://schemas.microsoft.com/office/powerpoint/2010/main" val="1834405372"/>
       </p:ext>
     </p:extLst>
   </p:cSld>
@@ -5107,7 +5114,7 @@
           <p:cNvPr id="3" name="Объект 2">
             <a:extLst>
               <a:ext uri="{FF2B5EF4-FFF2-40B4-BE49-F238E27FC236}">
-                <a16:creationId xmlns:a16="http://schemas.microsoft.com/office/drawing/2014/main" id="{342F5B4A-C29B-4C94-876A-94A944501DBF}"/>
+                <a16:creationId xmlns="" xmlns:a16="http://schemas.microsoft.com/office/drawing/2014/main" id="{342F5B4A-C29B-4C94-876A-94A944501DBF}"/>
               </a:ext>
             </a:extLst>
           </p:cNvPr>
@@ -5189,15 +5196,7 @@
             </a:r>
             <a:r>
               <a:rPr lang="ru-RU" dirty="0"/>
-              <a:t>, корректную </a:t>
-            </a:r>
-            <a:r>
-              <a:rPr lang="ru-RU"/>
-              <a:t>работу флагов</a:t>
-            </a:r>
-            <a:r>
-              <a:rPr lang="ru-RU" dirty="0"/>
-              <a:t>.</a:t>
+              <a:t>, корректную работу флагов.</a:t>
             </a:r>
           </a:p>
           <a:p>
@@ -5213,7 +5212,7 @@
           <p:cNvPr id="5" name="Заголовок 1">
             <a:extLst>
               <a:ext uri="{FF2B5EF4-FFF2-40B4-BE49-F238E27FC236}">
-                <a16:creationId xmlns:a16="http://schemas.microsoft.com/office/drawing/2014/main" id="{92A987DF-307E-4C50-98E9-DF5A55DD1985}"/>
+                <a16:creationId xmlns="" xmlns:a16="http://schemas.microsoft.com/office/drawing/2014/main" id="{92A987DF-307E-4C50-98E9-DF5A55DD1985}"/>
               </a:ext>
             </a:extLst>
           </p:cNvPr>
@@ -5248,7 +5247,7 @@
           <p:cNvPr id="2" name="TextBox 1">
             <a:extLst>
               <a:ext uri="{FF2B5EF4-FFF2-40B4-BE49-F238E27FC236}">
-                <a16:creationId xmlns:a16="http://schemas.microsoft.com/office/drawing/2014/main" id="{21C7F09A-3D1A-45CE-A62B-99783F6A2F2B}"/>
+                <a16:creationId xmlns="" xmlns:a16="http://schemas.microsoft.com/office/drawing/2014/main" id="{21C7F09A-3D1A-45CE-A62B-99783F6A2F2B}"/>
               </a:ext>
             </a:extLst>
           </p:cNvPr>
@@ -5683,7 +5682,7 @@
           <p:cNvPr id="5" name="Таблица 4">
             <a:extLst>
               <a:ext uri="{FF2B5EF4-FFF2-40B4-BE49-F238E27FC236}">
-                <a16:creationId xmlns:a16="http://schemas.microsoft.com/office/drawing/2014/main" id="{2F44CB77-FF0B-4673-84F1-BB743886F029}"/>
+                <a16:creationId xmlns="" xmlns:a16="http://schemas.microsoft.com/office/drawing/2014/main" id="{2F44CB77-FF0B-4673-84F1-BB743886F029}"/>
               </a:ext>
             </a:extLst>
           </p:cNvPr>
@@ -5700,7 +5699,7 @@
         </p:nvGraphicFramePr>
         <p:xfrm>
           <a:off x="1043608" y="2204864"/>
-          <a:ext cx="7056784" cy="3584448"/>
+          <a:ext cx="7056784" cy="3595116"/>
         </p:xfrm>
         <a:graphic>
           <a:graphicData uri="http://schemas.openxmlformats.org/drawingml/2006/table">
@@ -5712,49 +5711,49 @@
                 <a:gridCol w="598070">
                   <a:extLst>
                     <a:ext uri="{9D8B030D-6E8A-4147-A177-3AD203B41FA5}">
-                      <a16:colId xmlns:a16="http://schemas.microsoft.com/office/drawing/2014/main" val="4288314754"/>
+                      <a16:colId xmlns="" xmlns:a16="http://schemas.microsoft.com/office/drawing/2014/main" val="4288314754"/>
                     </a:ext>
                   </a:extLst>
                 </a:gridCol>
                 <a:gridCol w="1919566">
                   <a:extLst>
                     <a:ext uri="{9D8B030D-6E8A-4147-A177-3AD203B41FA5}">
-                      <a16:colId xmlns:a16="http://schemas.microsoft.com/office/drawing/2014/main" val="1809555903"/>
+                      <a16:colId xmlns="" xmlns:a16="http://schemas.microsoft.com/office/drawing/2014/main" val="1809555903"/>
                     </a:ext>
                   </a:extLst>
                 </a:gridCol>
                 <a:gridCol w="934108">
                   <a:extLst>
                     <a:ext uri="{9D8B030D-6E8A-4147-A177-3AD203B41FA5}">
-                      <a16:colId xmlns:a16="http://schemas.microsoft.com/office/drawing/2014/main" val="1021693919"/>
+                      <a16:colId xmlns="" xmlns:a16="http://schemas.microsoft.com/office/drawing/2014/main" val="1021693919"/>
                     </a:ext>
                   </a:extLst>
                 </a:gridCol>
                 <a:gridCol w="1056441">
                   <a:extLst>
                     <a:ext uri="{9D8B030D-6E8A-4147-A177-3AD203B41FA5}">
-                      <a16:colId xmlns:a16="http://schemas.microsoft.com/office/drawing/2014/main" val="1452748494"/>
+                      <a16:colId xmlns="" xmlns:a16="http://schemas.microsoft.com/office/drawing/2014/main" val="1452748494"/>
                     </a:ext>
                   </a:extLst>
                 </a:gridCol>
                 <a:gridCol w="849533">
                   <a:extLst>
                     <a:ext uri="{9D8B030D-6E8A-4147-A177-3AD203B41FA5}">
-                      <a16:colId xmlns:a16="http://schemas.microsoft.com/office/drawing/2014/main" val="3712489719"/>
+                      <a16:colId xmlns="" xmlns:a16="http://schemas.microsoft.com/office/drawing/2014/main" val="3712489719"/>
                     </a:ext>
                   </a:extLst>
                 </a:gridCol>
                 <a:gridCol w="849533">
                   <a:extLst>
                     <a:ext uri="{9D8B030D-6E8A-4147-A177-3AD203B41FA5}">
-                      <a16:colId xmlns:a16="http://schemas.microsoft.com/office/drawing/2014/main" val="1259631373"/>
+                      <a16:colId xmlns="" xmlns:a16="http://schemas.microsoft.com/office/drawing/2014/main" val="1259631373"/>
                     </a:ext>
                   </a:extLst>
                 </a:gridCol>
                 <a:gridCol w="849533">
                   <a:extLst>
                     <a:ext uri="{9D8B030D-6E8A-4147-A177-3AD203B41FA5}">
-                      <a16:colId xmlns:a16="http://schemas.microsoft.com/office/drawing/2014/main" val="4201019007"/>
+                      <a16:colId xmlns="" xmlns:a16="http://schemas.microsoft.com/office/drawing/2014/main" val="4201019007"/>
                     </a:ext>
                   </a:extLst>
                 </a:gridCol>
@@ -5971,7 +5970,7 @@
                 </a:tc>
                 <a:extLst>
                   <a:ext uri="{0D108BD9-81ED-4DB2-BD59-A6C34878D82A}">
-                    <a16:rowId xmlns:a16="http://schemas.microsoft.com/office/drawing/2014/main" val="841736910"/>
+                    <a16:rowId xmlns="" xmlns:a16="http://schemas.microsoft.com/office/drawing/2014/main" val="841736910"/>
                   </a:ext>
                 </a:extLst>
               </a:tr>
@@ -6181,7 +6180,7 @@
                 </a:tc>
                 <a:extLst>
                   <a:ext uri="{0D108BD9-81ED-4DB2-BD59-A6C34878D82A}">
-                    <a16:rowId xmlns:a16="http://schemas.microsoft.com/office/drawing/2014/main" val="1008249115"/>
+                    <a16:rowId xmlns="" xmlns:a16="http://schemas.microsoft.com/office/drawing/2014/main" val="1008249115"/>
                   </a:ext>
                 </a:extLst>
               </a:tr>
@@ -6391,7 +6390,7 @@
                 </a:tc>
                 <a:extLst>
                   <a:ext uri="{0D108BD9-81ED-4DB2-BD59-A6C34878D82A}">
-                    <a16:rowId xmlns:a16="http://schemas.microsoft.com/office/drawing/2014/main" val="3304276399"/>
+                    <a16:rowId xmlns="" xmlns:a16="http://schemas.microsoft.com/office/drawing/2014/main" val="3304276399"/>
                   </a:ext>
                 </a:extLst>
               </a:tr>
@@ -6601,7 +6600,7 @@
                 </a:tc>
                 <a:extLst>
                   <a:ext uri="{0D108BD9-81ED-4DB2-BD59-A6C34878D82A}">
-                    <a16:rowId xmlns:a16="http://schemas.microsoft.com/office/drawing/2014/main" val="2482474577"/>
+                    <a16:rowId xmlns="" xmlns:a16="http://schemas.microsoft.com/office/drawing/2014/main" val="2482474577"/>
                   </a:ext>
                 </a:extLst>
               </a:tr>
@@ -6811,7 +6810,7 @@
                 </a:tc>
                 <a:extLst>
                   <a:ext uri="{0D108BD9-81ED-4DB2-BD59-A6C34878D82A}">
-                    <a16:rowId xmlns:a16="http://schemas.microsoft.com/office/drawing/2014/main" val="3673785524"/>
+                    <a16:rowId xmlns="" xmlns:a16="http://schemas.microsoft.com/office/drawing/2014/main" val="3673785524"/>
                   </a:ext>
                 </a:extLst>
               </a:tr>
@@ -7021,7 +7020,7 @@
                 </a:tc>
                 <a:extLst>
                   <a:ext uri="{0D108BD9-81ED-4DB2-BD59-A6C34878D82A}">
-                    <a16:rowId xmlns:a16="http://schemas.microsoft.com/office/drawing/2014/main" val="1035707647"/>
+                    <a16:rowId xmlns="" xmlns:a16="http://schemas.microsoft.com/office/drawing/2014/main" val="1035707647"/>
                   </a:ext>
                 </a:extLst>
               </a:tr>
@@ -7231,7 +7230,7 @@
                 </a:tc>
                 <a:extLst>
                   <a:ext uri="{0D108BD9-81ED-4DB2-BD59-A6C34878D82A}">
-                    <a16:rowId xmlns:a16="http://schemas.microsoft.com/office/drawing/2014/main" val="1672052466"/>
+                    <a16:rowId xmlns="" xmlns:a16="http://schemas.microsoft.com/office/drawing/2014/main" val="1672052466"/>
                   </a:ext>
                 </a:extLst>
               </a:tr>
@@ -7441,7 +7440,7 @@
                 </a:tc>
                 <a:extLst>
                   <a:ext uri="{0D108BD9-81ED-4DB2-BD59-A6C34878D82A}">
-                    <a16:rowId xmlns:a16="http://schemas.microsoft.com/office/drawing/2014/main" val="3671735960"/>
+                    <a16:rowId xmlns="" xmlns:a16="http://schemas.microsoft.com/office/drawing/2014/main" val="3671735960"/>
                   </a:ext>
                 </a:extLst>
               </a:tr>
@@ -7651,7 +7650,7 @@
                 </a:tc>
                 <a:extLst>
                   <a:ext uri="{0D108BD9-81ED-4DB2-BD59-A6C34878D82A}">
-                    <a16:rowId xmlns:a16="http://schemas.microsoft.com/office/drawing/2014/main" val="1448887913"/>
+                    <a16:rowId xmlns="" xmlns:a16="http://schemas.microsoft.com/office/drawing/2014/main" val="1448887913"/>
                   </a:ext>
                 </a:extLst>
               </a:tr>
@@ -7861,7 +7860,7 @@
                 </a:tc>
                 <a:extLst>
                   <a:ext uri="{0D108BD9-81ED-4DB2-BD59-A6C34878D82A}">
-                    <a16:rowId xmlns:a16="http://schemas.microsoft.com/office/drawing/2014/main" val="90268800"/>
+                    <a16:rowId xmlns="" xmlns:a16="http://schemas.microsoft.com/office/drawing/2014/main" val="90268800"/>
                   </a:ext>
                 </a:extLst>
               </a:tr>
@@ -8071,7 +8070,7 @@
                 </a:tc>
                 <a:extLst>
                   <a:ext uri="{0D108BD9-81ED-4DB2-BD59-A6C34878D82A}">
-                    <a16:rowId xmlns:a16="http://schemas.microsoft.com/office/drawing/2014/main" val="3156748967"/>
+                    <a16:rowId xmlns="" xmlns:a16="http://schemas.microsoft.com/office/drawing/2014/main" val="3156748967"/>
                   </a:ext>
                 </a:extLst>
               </a:tr>
@@ -8281,7 +8280,7 @@
                 </a:tc>
                 <a:extLst>
                   <a:ext uri="{0D108BD9-81ED-4DB2-BD59-A6C34878D82A}">
-                    <a16:rowId xmlns:a16="http://schemas.microsoft.com/office/drawing/2014/main" val="621821705"/>
+                    <a16:rowId xmlns="" xmlns:a16="http://schemas.microsoft.com/office/drawing/2014/main" val="621821705"/>
                   </a:ext>
                 </a:extLst>
               </a:tr>
@@ -8550,7 +8549,7 @@
           <p:cNvPr id="7" name="Рисунок 6">
             <a:extLst>
               <a:ext uri="{FF2B5EF4-FFF2-40B4-BE49-F238E27FC236}">
-                <a16:creationId xmlns:a16="http://schemas.microsoft.com/office/drawing/2014/main" id="{0CA2A49E-70BF-4E17-87DC-F51722D565A4}"/>
+                <a16:creationId xmlns="" xmlns:a16="http://schemas.microsoft.com/office/drawing/2014/main" id="{0CA2A49E-70BF-4E17-87DC-F51722D565A4}"/>
               </a:ext>
             </a:extLst>
           </p:cNvPr>
@@ -8580,7 +8579,7 @@
           <p:cNvPr id="8" name="Рисунок 7">
             <a:extLst>
               <a:ext uri="{FF2B5EF4-FFF2-40B4-BE49-F238E27FC236}">
-                <a16:creationId xmlns:a16="http://schemas.microsoft.com/office/drawing/2014/main" id="{3B0225AA-5022-4AAA-8971-29B335439242}"/>
+                <a16:creationId xmlns="" xmlns:a16="http://schemas.microsoft.com/office/drawing/2014/main" id="{3B0225AA-5022-4AAA-8971-29B335439242}"/>
               </a:ext>
             </a:extLst>
           </p:cNvPr>
@@ -8608,7 +8607,7 @@
           <p:cNvPr id="9" name="Рисунок 8">
             <a:extLst>
               <a:ext uri="{FF2B5EF4-FFF2-40B4-BE49-F238E27FC236}">
-                <a16:creationId xmlns:a16="http://schemas.microsoft.com/office/drawing/2014/main" id="{0150F435-9C5F-4F6E-A656-A0019D4E1048}"/>
+                <a16:creationId xmlns="" xmlns:a16="http://schemas.microsoft.com/office/drawing/2014/main" id="{0150F435-9C5F-4F6E-A656-A0019D4E1048}"/>
               </a:ext>
             </a:extLst>
           </p:cNvPr>
@@ -8638,7 +8637,7 @@
           <p:cNvPr id="10" name="Стрелка: вниз 9">
             <a:extLst>
               <a:ext uri="{FF2B5EF4-FFF2-40B4-BE49-F238E27FC236}">
-                <a16:creationId xmlns:a16="http://schemas.microsoft.com/office/drawing/2014/main" id="{28C54050-DF9E-4EA3-8B6B-5862F781F699}"/>
+                <a16:creationId xmlns="" xmlns:a16="http://schemas.microsoft.com/office/drawing/2014/main" id="{28C54050-DF9E-4EA3-8B6B-5862F781F699}"/>
               </a:ext>
             </a:extLst>
           </p:cNvPr>
@@ -8684,7 +8683,7 @@
           <p:cNvPr id="11" name="TextBox 10">
             <a:extLst>
               <a:ext uri="{FF2B5EF4-FFF2-40B4-BE49-F238E27FC236}">
-                <a16:creationId xmlns:a16="http://schemas.microsoft.com/office/drawing/2014/main" id="{DE41E25D-9B4C-41CE-972D-DE8A05417FC6}"/>
+                <a16:creationId xmlns="" xmlns:a16="http://schemas.microsoft.com/office/drawing/2014/main" id="{DE41E25D-9B4C-41CE-972D-DE8A05417FC6}"/>
               </a:ext>
             </a:extLst>
           </p:cNvPr>
@@ -8736,7 +8735,7 @@
           <p:cNvPr id="12" name="Заголовок 1">
             <a:extLst>
               <a:ext uri="{FF2B5EF4-FFF2-40B4-BE49-F238E27FC236}">
-                <a16:creationId xmlns:a16="http://schemas.microsoft.com/office/drawing/2014/main" id="{31DCF4EB-624F-4817-AC32-682B0ABBD71A}"/>
+                <a16:creationId xmlns="" xmlns:a16="http://schemas.microsoft.com/office/drawing/2014/main" id="{31DCF4EB-624F-4817-AC32-682B0ABBD71A}"/>
               </a:ext>
             </a:extLst>
           </p:cNvPr>
@@ -8792,7 +8791,7 @@
           <p:cNvPr id="13" name="Заголовок 1">
             <a:extLst>
               <a:ext uri="{FF2B5EF4-FFF2-40B4-BE49-F238E27FC236}">
-                <a16:creationId xmlns:a16="http://schemas.microsoft.com/office/drawing/2014/main" id="{FCC8D4B3-14CC-4D4A-99A1-B35B24CA1A48}"/>
+                <a16:creationId xmlns="" xmlns:a16="http://schemas.microsoft.com/office/drawing/2014/main" id="{FCC8D4B3-14CC-4D4A-99A1-B35B24CA1A48}"/>
               </a:ext>
             </a:extLst>
           </p:cNvPr>
@@ -8843,7 +8842,7 @@
           <p:cNvPr id="14" name="Заголовок 1">
             <a:extLst>
               <a:ext uri="{FF2B5EF4-FFF2-40B4-BE49-F238E27FC236}">
-                <a16:creationId xmlns:a16="http://schemas.microsoft.com/office/drawing/2014/main" id="{99980ECD-B229-4FBF-AAC2-3238EC9E49F0}"/>
+                <a16:creationId xmlns="" xmlns:a16="http://schemas.microsoft.com/office/drawing/2014/main" id="{99980ECD-B229-4FBF-AAC2-3238EC9E49F0}"/>
               </a:ext>
             </a:extLst>
           </p:cNvPr>
@@ -8951,7 +8950,7 @@
           <p:cNvPr id="3" name="Рисунок 2">
             <a:extLst>
               <a:ext uri="{FF2B5EF4-FFF2-40B4-BE49-F238E27FC236}">
-                <a16:creationId xmlns:a16="http://schemas.microsoft.com/office/drawing/2014/main" id="{904898CB-3878-4D84-AC10-C042A8E84460}"/>
+                <a16:creationId xmlns="" xmlns:a16="http://schemas.microsoft.com/office/drawing/2014/main" id="{904898CB-3878-4D84-AC10-C042A8E84460}"/>
               </a:ext>
             </a:extLst>
           </p:cNvPr>
@@ -8983,7 +8982,7 @@
           <p:cNvPr id="4" name="Рисунок 3">
             <a:extLst>
               <a:ext uri="{FF2B5EF4-FFF2-40B4-BE49-F238E27FC236}">
-                <a16:creationId xmlns:a16="http://schemas.microsoft.com/office/drawing/2014/main" id="{8BBF0E0E-DF96-45EC-9B2A-6B015734076C}"/>
+                <a16:creationId xmlns="" xmlns:a16="http://schemas.microsoft.com/office/drawing/2014/main" id="{8BBF0E0E-DF96-45EC-9B2A-6B015734076C}"/>
               </a:ext>
             </a:extLst>
           </p:cNvPr>
@@ -9020,7 +9019,7 @@
           <p:cNvPr id="6" name="Заголовок 1">
             <a:extLst>
               <a:ext uri="{FF2B5EF4-FFF2-40B4-BE49-F238E27FC236}">
-                <a16:creationId xmlns:a16="http://schemas.microsoft.com/office/drawing/2014/main" id="{F8613225-80AE-4242-A5AE-25E4C0C8B202}"/>
+                <a16:creationId xmlns="" xmlns:a16="http://schemas.microsoft.com/office/drawing/2014/main" id="{F8613225-80AE-4242-A5AE-25E4C0C8B202}"/>
               </a:ext>
             </a:extLst>
           </p:cNvPr>
@@ -9071,7 +9070,7 @@
           <p:cNvPr id="7" name="Заголовок 1">
             <a:extLst>
               <a:ext uri="{FF2B5EF4-FFF2-40B4-BE49-F238E27FC236}">
-                <a16:creationId xmlns:a16="http://schemas.microsoft.com/office/drawing/2014/main" id="{634640D4-1F09-4EBB-8392-7BF308EAFC79}"/>
+                <a16:creationId xmlns="" xmlns:a16="http://schemas.microsoft.com/office/drawing/2014/main" id="{634640D4-1F09-4EBB-8392-7BF308EAFC79}"/>
               </a:ext>
             </a:extLst>
           </p:cNvPr>
@@ -9122,7 +9121,7 @@
           <p:cNvPr id="8" name="Заголовок 1">
             <a:extLst>
               <a:ext uri="{FF2B5EF4-FFF2-40B4-BE49-F238E27FC236}">
-                <a16:creationId xmlns:a16="http://schemas.microsoft.com/office/drawing/2014/main" id="{44BCF2E9-6E87-4C83-BB7E-63A63C075F75}"/>
+                <a16:creationId xmlns="" xmlns:a16="http://schemas.microsoft.com/office/drawing/2014/main" id="{44BCF2E9-6E87-4C83-BB7E-63A63C075F75}"/>
               </a:ext>
             </a:extLst>
           </p:cNvPr>
@@ -9174,7 +9173,7 @@
           <p:cNvPr id="10" name="Заголовок 1">
             <a:extLst>
               <a:ext uri="{FF2B5EF4-FFF2-40B4-BE49-F238E27FC236}">
-                <a16:creationId xmlns:a16="http://schemas.microsoft.com/office/drawing/2014/main" id="{ABDC8776-2B15-4387-A88C-C05FB178EC9A}"/>
+                <a16:creationId xmlns="" xmlns:a16="http://schemas.microsoft.com/office/drawing/2014/main" id="{ABDC8776-2B15-4387-A88C-C05FB178EC9A}"/>
               </a:ext>
             </a:extLst>
           </p:cNvPr>
@@ -9226,7 +9225,7 @@
           <p:cNvPr id="11" name="Заголовок 1">
             <a:extLst>
               <a:ext uri="{FF2B5EF4-FFF2-40B4-BE49-F238E27FC236}">
-                <a16:creationId xmlns:a16="http://schemas.microsoft.com/office/drawing/2014/main" id="{645E7B5D-07A9-4CBA-9A9B-89428B795EB4}"/>
+                <a16:creationId xmlns="" xmlns:a16="http://schemas.microsoft.com/office/drawing/2014/main" id="{645E7B5D-07A9-4CBA-9A9B-89428B795EB4}"/>
               </a:ext>
             </a:extLst>
           </p:cNvPr>
@@ -9278,7 +9277,7 @@
           <p:cNvPr id="12" name="Стрелка: вправо 11">
             <a:extLst>
               <a:ext uri="{FF2B5EF4-FFF2-40B4-BE49-F238E27FC236}">
-                <a16:creationId xmlns:a16="http://schemas.microsoft.com/office/drawing/2014/main" id="{F596CF50-DE4F-44FB-9C2B-C8D25600E958}"/>
+                <a16:creationId xmlns="" xmlns:a16="http://schemas.microsoft.com/office/drawing/2014/main" id="{F596CF50-DE4F-44FB-9C2B-C8D25600E958}"/>
               </a:ext>
             </a:extLst>
           </p:cNvPr>
@@ -9324,7 +9323,7 @@
           <p:cNvPr id="13" name="Стрелка: вправо 12">
             <a:extLst>
               <a:ext uri="{FF2B5EF4-FFF2-40B4-BE49-F238E27FC236}">
-                <a16:creationId xmlns:a16="http://schemas.microsoft.com/office/drawing/2014/main" id="{46009754-9E95-4A73-83F6-23A7B22F6D49}"/>
+                <a16:creationId xmlns="" xmlns:a16="http://schemas.microsoft.com/office/drawing/2014/main" id="{46009754-9E95-4A73-83F6-23A7B22F6D49}"/>
               </a:ext>
             </a:extLst>
           </p:cNvPr>
@@ -9370,7 +9369,7 @@
           <p:cNvPr id="14" name="Заголовок 1">
             <a:extLst>
               <a:ext uri="{FF2B5EF4-FFF2-40B4-BE49-F238E27FC236}">
-                <a16:creationId xmlns:a16="http://schemas.microsoft.com/office/drawing/2014/main" id="{F17B9437-4D4F-46D6-B7E9-6409067D7170}"/>
+                <a16:creationId xmlns="" xmlns:a16="http://schemas.microsoft.com/office/drawing/2014/main" id="{F17B9437-4D4F-46D6-B7E9-6409067D7170}"/>
               </a:ext>
             </a:extLst>
           </p:cNvPr>
@@ -9425,7 +9424,7 @@
           <p:cNvPr id="15" name="Заголовок 1">
             <a:extLst>
               <a:ext uri="{FF2B5EF4-FFF2-40B4-BE49-F238E27FC236}">
-                <a16:creationId xmlns:a16="http://schemas.microsoft.com/office/drawing/2014/main" id="{AD9858F6-F0DD-4F80-9C7E-6F99DFA94BA3}"/>
+                <a16:creationId xmlns="" xmlns:a16="http://schemas.microsoft.com/office/drawing/2014/main" id="{AD9858F6-F0DD-4F80-9C7E-6F99DFA94BA3}"/>
               </a:ext>
             </a:extLst>
           </p:cNvPr>
@@ -9480,7 +9479,7 @@
           <p:cNvPr id="17" name="TextBox 16">
             <a:extLst>
               <a:ext uri="{FF2B5EF4-FFF2-40B4-BE49-F238E27FC236}">
-                <a16:creationId xmlns:a16="http://schemas.microsoft.com/office/drawing/2014/main" id="{1EB5417B-47B9-49B0-89EE-8CA33180F08E}"/>
+                <a16:creationId xmlns="" xmlns:a16="http://schemas.microsoft.com/office/drawing/2014/main" id="{1EB5417B-47B9-49B0-89EE-8CA33180F08E}"/>
               </a:ext>
             </a:extLst>
           </p:cNvPr>
@@ -9580,7 +9579,7 @@
           <p:cNvPr id="10" name="Рисунок 9">
             <a:extLst>
               <a:ext uri="{FF2B5EF4-FFF2-40B4-BE49-F238E27FC236}">
-                <a16:creationId xmlns:a16="http://schemas.microsoft.com/office/drawing/2014/main" id="{38AE27DD-E3F2-4DF4-A578-C6DB03AFFEB1}"/>
+                <a16:creationId xmlns="" xmlns:a16="http://schemas.microsoft.com/office/drawing/2014/main" id="{38AE27DD-E3F2-4DF4-A578-C6DB03AFFEB1}"/>
               </a:ext>
             </a:extLst>
           </p:cNvPr>
@@ -9613,7 +9612,7 @@
           <p:cNvPr id="11" name="Рисунок 10">
             <a:extLst>
               <a:ext uri="{FF2B5EF4-FFF2-40B4-BE49-F238E27FC236}">
-                <a16:creationId xmlns:a16="http://schemas.microsoft.com/office/drawing/2014/main" id="{8E504D18-99D0-4765-859A-9231A0F9C766}"/>
+                <a16:creationId xmlns="" xmlns:a16="http://schemas.microsoft.com/office/drawing/2014/main" id="{8E504D18-99D0-4765-859A-9231A0F9C766}"/>
               </a:ext>
             </a:extLst>
           </p:cNvPr>
@@ -9646,7 +9645,7 @@
           <p:cNvPr id="12" name="Заголовок 1">
             <a:extLst>
               <a:ext uri="{FF2B5EF4-FFF2-40B4-BE49-F238E27FC236}">
-                <a16:creationId xmlns:a16="http://schemas.microsoft.com/office/drawing/2014/main" id="{86168443-8876-4337-A0CD-7F9F6F3488C7}"/>
+                <a16:creationId xmlns="" xmlns:a16="http://schemas.microsoft.com/office/drawing/2014/main" id="{86168443-8876-4337-A0CD-7F9F6F3488C7}"/>
               </a:ext>
             </a:extLst>
           </p:cNvPr>
@@ -9697,7 +9696,7 @@
           <p:cNvPr id="13" name="Заголовок 1">
             <a:extLst>
               <a:ext uri="{FF2B5EF4-FFF2-40B4-BE49-F238E27FC236}">
-                <a16:creationId xmlns:a16="http://schemas.microsoft.com/office/drawing/2014/main" id="{570247D2-C3C0-46B7-A9DE-42B319D68797}"/>
+                <a16:creationId xmlns="" xmlns:a16="http://schemas.microsoft.com/office/drawing/2014/main" id="{570247D2-C3C0-46B7-A9DE-42B319D68797}"/>
               </a:ext>
             </a:extLst>
           </p:cNvPr>
@@ -9748,7 +9747,7 @@
           <p:cNvPr id="14" name="Прямоугольник 13">
             <a:extLst>
               <a:ext uri="{FF2B5EF4-FFF2-40B4-BE49-F238E27FC236}">
-                <a16:creationId xmlns:a16="http://schemas.microsoft.com/office/drawing/2014/main" id="{F50D002B-058E-4F98-9AF4-66F020DCA7CB}"/>
+                <a16:creationId xmlns="" xmlns:a16="http://schemas.microsoft.com/office/drawing/2014/main" id="{F50D002B-058E-4F98-9AF4-66F020DCA7CB}"/>
               </a:ext>
             </a:extLst>
           </p:cNvPr>
@@ -9945,7 +9944,7 @@
           <p:cNvPr id="7" name="Рисунок 6">
             <a:extLst>
               <a:ext uri="{FF2B5EF4-FFF2-40B4-BE49-F238E27FC236}">
-                <a16:creationId xmlns:a16="http://schemas.microsoft.com/office/drawing/2014/main" id="{24AC9572-947A-46A5-90D9-55BF7272CCA3}"/>
+                <a16:creationId xmlns="" xmlns:a16="http://schemas.microsoft.com/office/drawing/2014/main" id="{24AC9572-947A-46A5-90D9-55BF7272CCA3}"/>
               </a:ext>
             </a:extLst>
           </p:cNvPr>
@@ -9977,7 +9976,7 @@
           <p:cNvPr id="8" name="Рисунок 7">
             <a:extLst>
               <a:ext uri="{FF2B5EF4-FFF2-40B4-BE49-F238E27FC236}">
-                <a16:creationId xmlns:a16="http://schemas.microsoft.com/office/drawing/2014/main" id="{0A49A755-2DCC-4638-8B86-974DCAFE4F52}"/>
+                <a16:creationId xmlns="" xmlns:a16="http://schemas.microsoft.com/office/drawing/2014/main" id="{0A49A755-2DCC-4638-8B86-974DCAFE4F52}"/>
               </a:ext>
             </a:extLst>
           </p:cNvPr>
@@ -10014,7 +10013,7 @@
           <p:cNvPr id="9" name="Прямоугольник 8">
             <a:extLst>
               <a:ext uri="{FF2B5EF4-FFF2-40B4-BE49-F238E27FC236}">
-                <a16:creationId xmlns:a16="http://schemas.microsoft.com/office/drawing/2014/main" id="{61DE1EFD-0702-43C4-A9F7-4C4E43565EB9}"/>
+                <a16:creationId xmlns="" xmlns:a16="http://schemas.microsoft.com/office/drawing/2014/main" id="{61DE1EFD-0702-43C4-A9F7-4C4E43565EB9}"/>
               </a:ext>
             </a:extLst>
           </p:cNvPr>
@@ -10181,6 +10180,13 @@
   <p:clrMapOvr>
     <a:masterClrMapping/>
   </p:clrMapOvr>
+  <p:timing>
+    <p:tnLst>
+      <p:par>
+        <p:cTn id="1" dur="indefinite" restart="never" nodeType="tmRoot"/>
+      </p:par>
+    </p:tnLst>
+  </p:timing>
 </p:sld>
 </file>
 
@@ -10235,30 +10241,43 @@
       </p:sp>
       <p:pic>
         <p:nvPicPr>
-          <p:cNvPr id="5" name="Google Shape;109;p8"/>
-          <p:cNvPicPr preferRelativeResize="0"/>
+          <p:cNvPr id="1028" name="Picture 4" descr="C:\Users\kalistratov\Downloads\Untitled Diagram-Page-10.drawio (3).png"/>
+          <p:cNvPicPr>
+            <a:picLocks noChangeAspect="1" noChangeArrowheads="1"/>
+          </p:cNvPicPr>
           <p:nvPr/>
         </p:nvPicPr>
         <p:blipFill>
           <a:blip r:embed="rId2">
-            <a:alphaModFix/>
+            <a:extLst>
+              <a:ext uri="{28A0092B-C50C-407E-A947-70E740481C1C}">
+                <a14:useLocalDpi xmlns:a14="http://schemas.microsoft.com/office/drawing/2010/main" val="0"/>
+              </a:ext>
+            </a:extLst>
           </a:blip>
+          <a:srcRect/>
           <a:stretch>
             <a:fillRect/>
           </a:stretch>
         </p:blipFill>
-        <p:spPr>
+        <p:spPr bwMode="auto">
           <a:xfrm>
-            <a:off x="899592" y="1932072"/>
-            <a:ext cx="7322963" cy="4522068"/>
+            <a:off x="1331640" y="1556792"/>
+            <a:ext cx="6543256" cy="5076928"/>
           </a:xfrm>
           <a:prstGeom prst="rect">
             <a:avLst/>
           </a:prstGeom>
           <a:noFill/>
-          <a:ln>
-            <a:noFill/>
-          </a:ln>
+          <a:extLst>
+            <a:ext uri="{909E8E84-426E-40DD-AFC4-6F175D3DCCD1}">
+              <a14:hiddenFill xmlns:a14="http://schemas.microsoft.com/office/drawing/2010/main">
+                <a:solidFill>
+                  <a:srgbClr val="FFFFFF"/>
+                </a:solidFill>
+              </a14:hiddenFill>
+            </a:ext>
+          </a:extLst>
         </p:spPr>
       </p:pic>
     </p:spTree>
@@ -10271,6 +10290,13 @@
   <p:clrMapOvr>
     <a:masterClrMapping/>
   </p:clrMapOvr>
+  <p:timing>
+    <p:tnLst>
+      <p:par>
+        <p:cTn id="1" dur="indefinite" restart="never" nodeType="tmRoot"/>
+      </p:par>
+    </p:tnLst>
+  </p:timing>
 </p:sld>
 </file>
 
@@ -10605,7 +10631,7 @@
     </a:clrScheme>
     <a:fontScheme name="Стандартная">
       <a:majorFont>
-        <a:latin typeface="Calibri Light" panose="020F0302020204030204"/>
+        <a:latin typeface="Calibri Light"/>
         <a:ea typeface=""/>
         <a:cs typeface=""/>
         <a:font script="Jpan" typeface="游ゴシック Light"/>
@@ -10657,7 +10683,7 @@
         <a:font script="Tfng" typeface="Ebrima"/>
       </a:majorFont>
       <a:minorFont>
-        <a:latin typeface="Calibri" panose="020F0502020204030204"/>
+        <a:latin typeface="Calibri"/>
         <a:ea typeface=""/>
         <a:cs typeface=""/>
         <a:font script="Jpan" typeface="游ゴシック"/>
@@ -10851,7 +10877,7 @@
   <a:extraClrSchemeLst/>
   <a:extLst>
     <a:ext uri="{05A4C25C-085E-4340-85A3-A5531E510DB2}">
-      <thm15:themeFamily xmlns:thm15="http://schemas.microsoft.com/office/thememl/2012/main" name="Office Theme" id="{62F939B6-93AF-4DB8-9C6B-D6C7DFDC589F}" vid="{4A3C46E8-61CC-4603-A589-7422A47A8E4A}"/>
+      <thm15:themeFamily xmlns="" xmlns:thm15="http://schemas.microsoft.com/office/thememl/2012/main" name="Office Theme" id="{62F939B6-93AF-4DB8-9C6B-D6C7DFDC589F}" vid="{4A3C46E8-61CC-4603-A589-7422A47A8E4A}"/>
     </a:ext>
   </a:extLst>
 </a:theme>

</xml_diff>

<commit_message>
[DOCs] Fixed typo in CRC-16 variants table
</commit_message>
<xml_diff>
--- a/doc/Labs/LabWork2/LabWork2.pptx
+++ b/doc/Labs/LabWork2/LabWork2.pptx
@@ -121,7 +121,7 @@
   </p:defaultTextStyle>
   <p:extLst>
     <p:ext uri="{EFAFB233-063F-42B5-8137-9DF3F51BA10A}">
-      <p15:sldGuideLst xmlns="" xmlns:p15="http://schemas.microsoft.com/office/powerpoint/2012/main">
+      <p15:sldGuideLst xmlns:p15="http://schemas.microsoft.com/office/powerpoint/2012/main">
         <p15:guide id="1" orient="horz" pos="2160">
           <p15:clr>
             <a:srgbClr val="A4A3A4"/>
@@ -143,7 +143,7 @@
   <p:cmAuthor id="1" name="Kirill Liubavin" initials="KL" lastIdx="1" clrIdx="0">
     <p:extLst>
       <p:ext uri="{19B8F6BF-5375-455C-9EA6-DF929625EA0E}">
-        <p15:presenceInfo xmlns="" xmlns:p15="http://schemas.microsoft.com/office/powerpoint/2012/main" userId="186205f477ad8eca" providerId="Windows Live"/>
+        <p15:presenceInfo xmlns:p15="http://schemas.microsoft.com/office/powerpoint/2012/main" userId="186205f477ad8eca" providerId="Windows Live"/>
       </p:ext>
     </p:extLst>
   </p:cmAuthor>
@@ -157,7 +157,7 @@
     <p:text/>
     <p:extLst>
       <p:ext uri="{C676402C-5697-4E1C-873F-D02D1690AC5C}">
-        <p15:threadingInfo xmlns="" xmlns:p15="http://schemas.microsoft.com/office/powerpoint/2012/main" timeZoneBias="-180"/>
+        <p15:threadingInfo xmlns:p15="http://schemas.microsoft.com/office/powerpoint/2012/main" timeZoneBias="-180"/>
       </p:ext>
     </p:extLst>
   </p:cm>
@@ -246,7 +246,7 @@
           <a:p>
             <a:fld id="{FA587C48-06B1-4573-B672-8D531DAFB1D4}" type="datetimeFigureOut">
               <a:rPr lang="ru-RU" smtClean="0"/>
-              <a:t>24.02.2022</a:t>
+              <a:t>09.03.2022</a:t>
             </a:fld>
             <a:endParaRPr lang="ru-RU"/>
           </a:p>
@@ -785,7 +785,7 @@
           <a:p>
             <a:fld id="{B4C71EC6-210F-42DE-9C53-41977AD35B3D}" type="datetimeFigureOut">
               <a:rPr lang="ru-RU" smtClean="0"/>
-              <a:t>24.02.2022</a:t>
+              <a:t>09.03.2022</a:t>
             </a:fld>
             <a:endParaRPr lang="ru-RU"/>
           </a:p>
@@ -985,7 +985,7 @@
           <a:p>
             <a:fld id="{B4C71EC6-210F-42DE-9C53-41977AD35B3D}" type="datetimeFigureOut">
               <a:rPr lang="ru-RU" smtClean="0"/>
-              <a:t>24.02.2022</a:t>
+              <a:t>09.03.2022</a:t>
             </a:fld>
             <a:endParaRPr lang="ru-RU"/>
           </a:p>
@@ -1160,7 +1160,7 @@
           <a:p>
             <a:fld id="{B4C71EC6-210F-42DE-9C53-41977AD35B3D}" type="datetimeFigureOut">
               <a:rPr lang="ru-RU" smtClean="0"/>
-              <a:t>24.02.2022</a:t>
+              <a:t>09.03.2022</a:t>
             </a:fld>
             <a:endParaRPr lang="ru-RU"/>
           </a:p>
@@ -1325,7 +1325,7 @@
           <a:p>
             <a:fld id="{B4C71EC6-210F-42DE-9C53-41977AD35B3D}" type="datetimeFigureOut">
               <a:rPr lang="ru-RU" smtClean="0"/>
-              <a:t>24.02.2022</a:t>
+              <a:t>09.03.2022</a:t>
             </a:fld>
             <a:endParaRPr lang="ru-RU"/>
           </a:p>
@@ -1573,7 +1573,7 @@
           <a:p>
             <a:fld id="{B4C71EC6-210F-42DE-9C53-41977AD35B3D}" type="datetimeFigureOut">
               <a:rPr lang="ru-RU" smtClean="0"/>
-              <a:t>24.02.2022</a:t>
+              <a:t>09.03.2022</a:t>
             </a:fld>
             <a:endParaRPr lang="ru-RU"/>
           </a:p>
@@ -1891,7 +1891,7 @@
           <a:p>
             <a:fld id="{B4C71EC6-210F-42DE-9C53-41977AD35B3D}" type="datetimeFigureOut">
               <a:rPr lang="ru-RU" smtClean="0"/>
-              <a:t>24.02.2022</a:t>
+              <a:t>09.03.2022</a:t>
             </a:fld>
             <a:endParaRPr lang="ru-RU"/>
           </a:p>
@@ -2357,7 +2357,7 @@
           <a:p>
             <a:fld id="{B4C71EC6-210F-42DE-9C53-41977AD35B3D}" type="datetimeFigureOut">
               <a:rPr lang="ru-RU" smtClean="0"/>
-              <a:t>24.02.2022</a:t>
+              <a:t>09.03.2022</a:t>
             </a:fld>
             <a:endParaRPr lang="ru-RU"/>
           </a:p>
@@ -2505,7 +2505,7 @@
           <a:p>
             <a:fld id="{B4C71EC6-210F-42DE-9C53-41977AD35B3D}" type="datetimeFigureOut">
               <a:rPr lang="ru-RU" smtClean="0"/>
-              <a:t>24.02.2022</a:t>
+              <a:t>09.03.2022</a:t>
             </a:fld>
             <a:endParaRPr lang="ru-RU"/>
           </a:p>
@@ -2595,7 +2595,7 @@
           <a:p>
             <a:fld id="{B4C71EC6-210F-42DE-9C53-41977AD35B3D}" type="datetimeFigureOut">
               <a:rPr lang="ru-RU" smtClean="0"/>
-              <a:t>24.02.2022</a:t>
+              <a:t>09.03.2022</a:t>
             </a:fld>
             <a:endParaRPr lang="ru-RU"/>
           </a:p>
@@ -2869,7 +2869,7 @@
           <a:p>
             <a:fld id="{B4C71EC6-210F-42DE-9C53-41977AD35B3D}" type="datetimeFigureOut">
               <a:rPr lang="ru-RU" smtClean="0"/>
-              <a:t>24.02.2022</a:t>
+              <a:t>09.03.2022</a:t>
             </a:fld>
             <a:endParaRPr lang="ru-RU"/>
           </a:p>
@@ -3174,7 +3174,7 @@
           <a:p>
             <a:fld id="{B4C71EC6-210F-42DE-9C53-41977AD35B3D}" type="datetimeFigureOut">
               <a:rPr lang="ru-RU" smtClean="0"/>
-              <a:t>24.02.2022</a:t>
+              <a:t>09.03.2022</a:t>
             </a:fld>
             <a:endParaRPr lang="ru-RU"/>
           </a:p>
@@ -3472,7 +3472,7 @@
           <a:p>
             <a:fld id="{B4C71EC6-210F-42DE-9C53-41977AD35B3D}" type="datetimeFigureOut">
               <a:rPr lang="ru-RU" smtClean="0"/>
-              <a:t>24.02.2022</a:t>
+              <a:t>09.03.2022</a:t>
             </a:fld>
             <a:endParaRPr lang="ru-RU"/>
           </a:p>
@@ -3874,7 +3874,7 @@
           <p:cNvPr id="6" name="Заголовок 1">
             <a:extLst>
               <a:ext uri="{FF2B5EF4-FFF2-40B4-BE49-F238E27FC236}">
-                <a16:creationId xmlns="" xmlns:a16="http://schemas.microsoft.com/office/drawing/2014/main" id="{C1A4EEC1-D9E6-417F-9F48-1B5DA26E3F3F}"/>
+                <a16:creationId xmlns:a16="http://schemas.microsoft.com/office/drawing/2014/main" id="{C1A4EEC1-D9E6-417F-9F48-1B5DA26E3F3F}"/>
               </a:ext>
             </a:extLst>
           </p:cNvPr>
@@ -3915,7 +3915,7 @@
           <p:cNvPr id="7" name="Подзаголовок 2">
             <a:extLst>
               <a:ext uri="{FF2B5EF4-FFF2-40B4-BE49-F238E27FC236}">
-                <a16:creationId xmlns="" xmlns:a16="http://schemas.microsoft.com/office/drawing/2014/main" id="{98917299-8BA9-4927-BE73-597D48B99790}"/>
+                <a16:creationId xmlns:a16="http://schemas.microsoft.com/office/drawing/2014/main" id="{98917299-8BA9-4927-BE73-597D48B99790}"/>
               </a:ext>
             </a:extLst>
           </p:cNvPr>
@@ -4323,7 +4323,7 @@
                       <m:sSupPr>
                         <m:ctrlPr>
                           <a:rPr lang="en-US" sz="1800" b="1" i="1" smtClean="0">
-                            <a:latin typeface="Cambria Math"/>
+                            <a:latin typeface="Cambria Math" panose="02040503050406030204" pitchFamily="18" charset="0"/>
                           </a:rPr>
                         </m:ctrlPr>
                       </m:sSupPr>
@@ -4354,7 +4354,7 @@
                       <m:sSupPr>
                         <m:ctrlPr>
                           <a:rPr lang="en-US" sz="1800" b="1" i="1">
-                            <a:latin typeface="Cambria Math"/>
+                            <a:latin typeface="Cambria Math" panose="02040503050406030204" pitchFamily="18" charset="0"/>
                           </a:rPr>
                         </m:ctrlPr>
                       </m:sSupPr>
@@ -4391,7 +4391,7 @@
                       <m:sSupPr>
                         <m:ctrlPr>
                           <a:rPr lang="en-US" sz="1800" b="1" i="1">
-                            <a:latin typeface="Cambria Math"/>
+                            <a:latin typeface="Cambria Math" panose="02040503050406030204" pitchFamily="18" charset="0"/>
                           </a:rPr>
                         </m:ctrlPr>
                       </m:sSupPr>
@@ -4520,13 +4520,6 @@
   <p:clrMapOvr>
     <a:masterClrMapping/>
   </p:clrMapOvr>
-  <p:timing>
-    <p:tnLst>
-      <p:par>
-        <p:cTn id="1" dur="indefinite" restart="never" nodeType="tmRoot"/>
-      </p:par>
-    </p:tnLst>
-  </p:timing>
 </p:sld>
 </file>
 
@@ -4892,7 +4885,7 @@
                       <m:sSupPr>
                         <m:ctrlPr>
                           <a:rPr lang="en-US" sz="1800" b="1" i="1" smtClean="0">
-                            <a:latin typeface="Cambria Math"/>
+                            <a:latin typeface="Cambria Math" panose="02040503050406030204" pitchFamily="18" charset="0"/>
                           </a:rPr>
                         </m:ctrlPr>
                       </m:sSupPr>
@@ -4923,7 +4916,7 @@
                       <m:sSupPr>
                         <m:ctrlPr>
                           <a:rPr lang="en-US" sz="1800" b="1" i="1">
-                            <a:latin typeface="Cambria Math"/>
+                            <a:latin typeface="Cambria Math" panose="02040503050406030204" pitchFamily="18" charset="0"/>
                           </a:rPr>
                         </m:ctrlPr>
                       </m:sSupPr>
@@ -4960,7 +4953,7 @@
                       <m:sSupPr>
                         <m:ctrlPr>
                           <a:rPr lang="en-US" sz="1800" b="1" i="1">
-                            <a:latin typeface="Cambria Math"/>
+                            <a:latin typeface="Cambria Math" panose="02040503050406030204" pitchFamily="18" charset="0"/>
                           </a:rPr>
                         </m:ctrlPr>
                       </m:sSupPr>
@@ -5114,7 +5107,7 @@
           <p:cNvPr id="3" name="Объект 2">
             <a:extLst>
               <a:ext uri="{FF2B5EF4-FFF2-40B4-BE49-F238E27FC236}">
-                <a16:creationId xmlns="" xmlns:a16="http://schemas.microsoft.com/office/drawing/2014/main" id="{342F5B4A-C29B-4C94-876A-94A944501DBF}"/>
+                <a16:creationId xmlns:a16="http://schemas.microsoft.com/office/drawing/2014/main" id="{342F5B4A-C29B-4C94-876A-94A944501DBF}"/>
               </a:ext>
             </a:extLst>
           </p:cNvPr>
@@ -5212,7 +5205,7 @@
           <p:cNvPr id="5" name="Заголовок 1">
             <a:extLst>
               <a:ext uri="{FF2B5EF4-FFF2-40B4-BE49-F238E27FC236}">
-                <a16:creationId xmlns="" xmlns:a16="http://schemas.microsoft.com/office/drawing/2014/main" id="{92A987DF-307E-4C50-98E9-DF5A55DD1985}"/>
+                <a16:creationId xmlns:a16="http://schemas.microsoft.com/office/drawing/2014/main" id="{92A987DF-307E-4C50-98E9-DF5A55DD1985}"/>
               </a:ext>
             </a:extLst>
           </p:cNvPr>
@@ -5247,7 +5240,7 @@
           <p:cNvPr id="2" name="TextBox 1">
             <a:extLst>
               <a:ext uri="{FF2B5EF4-FFF2-40B4-BE49-F238E27FC236}">
-                <a16:creationId xmlns="" xmlns:a16="http://schemas.microsoft.com/office/drawing/2014/main" id="{21C7F09A-3D1A-45CE-A62B-99783F6A2F2B}"/>
+                <a16:creationId xmlns:a16="http://schemas.microsoft.com/office/drawing/2014/main" id="{21C7F09A-3D1A-45CE-A62B-99783F6A2F2B}"/>
               </a:ext>
             </a:extLst>
           </p:cNvPr>
@@ -5682,7 +5675,7 @@
           <p:cNvPr id="5" name="Таблица 4">
             <a:extLst>
               <a:ext uri="{FF2B5EF4-FFF2-40B4-BE49-F238E27FC236}">
-                <a16:creationId xmlns="" xmlns:a16="http://schemas.microsoft.com/office/drawing/2014/main" id="{2F44CB77-FF0B-4673-84F1-BB743886F029}"/>
+                <a16:creationId xmlns:a16="http://schemas.microsoft.com/office/drawing/2014/main" id="{2F44CB77-FF0B-4673-84F1-BB743886F029}"/>
               </a:ext>
             </a:extLst>
           </p:cNvPr>
@@ -5692,14 +5685,14 @@
           <p:nvPr>
             <p:extLst>
               <p:ext uri="{D42A27DB-BD31-4B8C-83A1-F6EECF244321}">
-                <p14:modId xmlns:p14="http://schemas.microsoft.com/office/powerpoint/2010/main" val="2641793470"/>
+                <p14:modId xmlns:p14="http://schemas.microsoft.com/office/powerpoint/2010/main" val="1109496962"/>
               </p:ext>
             </p:extLst>
           </p:nvPr>
         </p:nvGraphicFramePr>
         <p:xfrm>
           <a:off x="1043608" y="2204864"/>
-          <a:ext cx="7056784" cy="3595116"/>
+          <a:ext cx="7056784" cy="3584448"/>
         </p:xfrm>
         <a:graphic>
           <a:graphicData uri="http://schemas.openxmlformats.org/drawingml/2006/table">
@@ -5711,49 +5704,49 @@
                 <a:gridCol w="598070">
                   <a:extLst>
                     <a:ext uri="{9D8B030D-6E8A-4147-A177-3AD203B41FA5}">
-                      <a16:colId xmlns="" xmlns:a16="http://schemas.microsoft.com/office/drawing/2014/main" val="4288314754"/>
+                      <a16:colId xmlns:a16="http://schemas.microsoft.com/office/drawing/2014/main" val="4288314754"/>
                     </a:ext>
                   </a:extLst>
                 </a:gridCol>
                 <a:gridCol w="1919566">
                   <a:extLst>
                     <a:ext uri="{9D8B030D-6E8A-4147-A177-3AD203B41FA5}">
-                      <a16:colId xmlns="" xmlns:a16="http://schemas.microsoft.com/office/drawing/2014/main" val="1809555903"/>
+                      <a16:colId xmlns:a16="http://schemas.microsoft.com/office/drawing/2014/main" val="1809555903"/>
                     </a:ext>
                   </a:extLst>
                 </a:gridCol>
                 <a:gridCol w="934108">
                   <a:extLst>
                     <a:ext uri="{9D8B030D-6E8A-4147-A177-3AD203B41FA5}">
-                      <a16:colId xmlns="" xmlns:a16="http://schemas.microsoft.com/office/drawing/2014/main" val="1021693919"/>
+                      <a16:colId xmlns:a16="http://schemas.microsoft.com/office/drawing/2014/main" val="1021693919"/>
                     </a:ext>
                   </a:extLst>
                 </a:gridCol>
                 <a:gridCol w="1056441">
                   <a:extLst>
                     <a:ext uri="{9D8B030D-6E8A-4147-A177-3AD203B41FA5}">
-                      <a16:colId xmlns="" xmlns:a16="http://schemas.microsoft.com/office/drawing/2014/main" val="1452748494"/>
+                      <a16:colId xmlns:a16="http://schemas.microsoft.com/office/drawing/2014/main" val="1452748494"/>
                     </a:ext>
                   </a:extLst>
                 </a:gridCol>
                 <a:gridCol w="849533">
                   <a:extLst>
                     <a:ext uri="{9D8B030D-6E8A-4147-A177-3AD203B41FA5}">
-                      <a16:colId xmlns="" xmlns:a16="http://schemas.microsoft.com/office/drawing/2014/main" val="3712489719"/>
+                      <a16:colId xmlns:a16="http://schemas.microsoft.com/office/drawing/2014/main" val="3712489719"/>
                     </a:ext>
                   </a:extLst>
                 </a:gridCol>
                 <a:gridCol w="849533">
                   <a:extLst>
                     <a:ext uri="{9D8B030D-6E8A-4147-A177-3AD203B41FA5}">
-                      <a16:colId xmlns="" xmlns:a16="http://schemas.microsoft.com/office/drawing/2014/main" val="1259631373"/>
+                      <a16:colId xmlns:a16="http://schemas.microsoft.com/office/drawing/2014/main" val="1259631373"/>
                     </a:ext>
                   </a:extLst>
                 </a:gridCol>
                 <a:gridCol w="849533">
                   <a:extLst>
                     <a:ext uri="{9D8B030D-6E8A-4147-A177-3AD203B41FA5}">
-                      <a16:colId xmlns="" xmlns:a16="http://schemas.microsoft.com/office/drawing/2014/main" val="4201019007"/>
+                      <a16:colId xmlns:a16="http://schemas.microsoft.com/office/drawing/2014/main" val="4201019007"/>
                     </a:ext>
                   </a:extLst>
                 </a:gridCol>
@@ -5970,7 +5963,7 @@
                 </a:tc>
                 <a:extLst>
                   <a:ext uri="{0D108BD9-81ED-4DB2-BD59-A6C34878D82A}">
-                    <a16:rowId xmlns="" xmlns:a16="http://schemas.microsoft.com/office/drawing/2014/main" val="841736910"/>
+                    <a16:rowId xmlns:a16="http://schemas.microsoft.com/office/drawing/2014/main" val="841736910"/>
                   </a:ext>
                 </a:extLst>
               </a:tr>
@@ -6018,10 +6011,45 @@
                         </a:spcAft>
                       </a:pPr>
                       <a:r>
+                        <a:rPr lang="ru-RU" sz="1100" dirty="0">
+                          <a:effectLst/>
+                          <a:latin typeface="Arial" panose="020B0604020202020204" pitchFamily="34" charset="0"/>
+                          <a:ea typeface="Calibri" panose="020F0502020204030204" pitchFamily="34" charset="0"/>
+                          <a:cs typeface="Times New Roman" panose="02020603050405020304" pitchFamily="18" charset="0"/>
+                        </a:rPr>
+                        <a:t>MAXIM</a:t>
+                      </a:r>
+                      <a:endParaRPr lang="ru-RU" sz="1100" dirty="0">
+                        <a:effectLst/>
+                        <a:latin typeface="Calibri" panose="020F0502020204030204" pitchFamily="34" charset="0"/>
+                        <a:ea typeface="Calibri" panose="020F0502020204030204" pitchFamily="34" charset="0"/>
+                        <a:cs typeface="Times New Roman" panose="02020603050405020304" pitchFamily="18" charset="0"/>
+                      </a:endParaRPr>
+                    </a:p>
+                  </a:txBody>
+                  <a:tcPr marL="68580" marR="68580" marT="0" marB="0" anchor="ctr"/>
+                </a:tc>
+                <a:tc>
+                  <a:txBody>
+                    <a:bodyPr/>
+                    <a:lstStyle/>
+                    <a:p>
+                      <a:pPr algn="ctr">
+                        <a:lnSpc>
+                          <a:spcPct val="107000"/>
+                        </a:lnSpc>
+                        <a:spcAft>
+                          <a:spcPts val="0"/>
+                        </a:spcAft>
+                      </a:pPr>
+                      <a:r>
                         <a:rPr lang="ru-RU" sz="1100">
                           <a:effectLst/>
+                          <a:latin typeface="Arial" panose="020B0604020202020204" pitchFamily="34" charset="0"/>
+                          <a:ea typeface="Calibri" panose="020F0502020204030204" pitchFamily="34" charset="0"/>
+                          <a:cs typeface="Times New Roman" panose="02020603050405020304" pitchFamily="18" charset="0"/>
                         </a:rPr>
-                        <a:t>CRC-16/MAXIM</a:t>
+                        <a:t>0x8005</a:t>
                       </a:r>
                       <a:endParaRPr lang="ru-RU" sz="1100">
                         <a:effectLst/>
@@ -6049,8 +6077,11 @@
                       <a:r>
                         <a:rPr lang="ru-RU" sz="1100">
                           <a:effectLst/>
+                          <a:latin typeface="Arial" panose="020B0604020202020204" pitchFamily="34" charset="0"/>
+                          <a:ea typeface="Calibri" panose="020F0502020204030204" pitchFamily="34" charset="0"/>
+                          <a:cs typeface="Times New Roman" panose="02020603050405020304" pitchFamily="18" charset="0"/>
                         </a:rPr>
-                        <a:t>0x1021</a:t>
+                        <a:t>0x0000</a:t>
                       </a:r>
                       <a:endParaRPr lang="ru-RU" sz="1100">
                         <a:effectLst/>
@@ -6076,12 +6107,47 @@
                         </a:spcAft>
                       </a:pPr>
                       <a:r>
-                        <a:rPr lang="ru-RU" sz="1100">
+                        <a:rPr lang="en-US" sz="1100" dirty="0">
                           <a:effectLst/>
+                          <a:latin typeface="Arial" panose="020B0604020202020204" pitchFamily="34" charset="0"/>
+                          <a:ea typeface="Calibri" panose="020F0502020204030204" pitchFamily="34" charset="0"/>
+                          <a:cs typeface="Times New Roman" panose="02020603050405020304" pitchFamily="18" charset="0"/>
                         </a:rPr>
-                        <a:t>0xFFFF</a:t>
+                        <a:t>TRUE</a:t>
                       </a:r>
-                      <a:endParaRPr lang="ru-RU" sz="1100">
+                      <a:endParaRPr lang="ru-RU" sz="1100" dirty="0">
+                        <a:effectLst/>
+                        <a:latin typeface="Calibri" panose="020F0502020204030204" pitchFamily="34" charset="0"/>
+                        <a:ea typeface="Calibri" panose="020F0502020204030204" pitchFamily="34" charset="0"/>
+                        <a:cs typeface="Times New Roman" panose="02020603050405020304" pitchFamily="18" charset="0"/>
+                      </a:endParaRPr>
+                    </a:p>
+                  </a:txBody>
+                  <a:tcPr marL="68580" marR="68580" marT="0" marB="0" anchor="ctr"/>
+                </a:tc>
+                <a:tc>
+                  <a:txBody>
+                    <a:bodyPr/>
+                    <a:lstStyle/>
+                    <a:p>
+                      <a:pPr algn="ctr">
+                        <a:lnSpc>
+                          <a:spcPct val="107000"/>
+                        </a:lnSpc>
+                        <a:spcAft>
+                          <a:spcPts val="0"/>
+                        </a:spcAft>
+                      </a:pPr>
+                      <a:r>
+                        <a:rPr lang="en-US" sz="1100" dirty="0">
+                          <a:effectLst/>
+                          <a:latin typeface="Arial" panose="020B0604020202020204" pitchFamily="34" charset="0"/>
+                          <a:ea typeface="Calibri" panose="020F0502020204030204" pitchFamily="34" charset="0"/>
+                          <a:cs typeface="Times New Roman" panose="02020603050405020304" pitchFamily="18" charset="0"/>
+                        </a:rPr>
+                        <a:t>TRUE</a:t>
+                      </a:r>
+                      <a:endParaRPr lang="ru-RU" sz="1100" dirty="0">
                         <a:effectLst/>
                         <a:latin typeface="Calibri" panose="020F0502020204030204" pitchFamily="34" charset="0"/>
                         <a:ea typeface="Calibri" panose="020F0502020204030204" pitchFamily="34" charset="0"/>
@@ -6107,66 +6173,11 @@
                       <a:r>
                         <a:rPr lang="ru-RU" sz="1100">
                           <a:effectLst/>
+                          <a:latin typeface="Arial" panose="020B0604020202020204" pitchFamily="34" charset="0"/>
+                          <a:ea typeface="Calibri" panose="020F0502020204030204" pitchFamily="34" charset="0"/>
+                          <a:cs typeface="Times New Roman" panose="02020603050405020304" pitchFamily="18" charset="0"/>
                         </a:rPr>
-                        <a:t>FALSE</a:t>
-                      </a:r>
-                      <a:endParaRPr lang="ru-RU" sz="1100">
-                        <a:effectLst/>
-                        <a:latin typeface="Calibri" panose="020F0502020204030204" pitchFamily="34" charset="0"/>
-                        <a:ea typeface="Calibri" panose="020F0502020204030204" pitchFamily="34" charset="0"/>
-                        <a:cs typeface="Times New Roman" panose="02020603050405020304" pitchFamily="18" charset="0"/>
-                      </a:endParaRPr>
-                    </a:p>
-                  </a:txBody>
-                  <a:tcPr marL="68580" marR="68580" marT="0" marB="0" anchor="ctr"/>
-                </a:tc>
-                <a:tc>
-                  <a:txBody>
-                    <a:bodyPr/>
-                    <a:lstStyle/>
-                    <a:p>
-                      <a:pPr algn="ctr">
-                        <a:lnSpc>
-                          <a:spcPct val="107000"/>
-                        </a:lnSpc>
-                        <a:spcAft>
-                          <a:spcPts val="0"/>
-                        </a:spcAft>
-                      </a:pPr>
-                      <a:r>
-                        <a:rPr lang="ru-RU" sz="1100">
-                          <a:effectLst/>
-                        </a:rPr>
-                        <a:t>FALSE</a:t>
-                      </a:r>
-                      <a:endParaRPr lang="ru-RU" sz="1100">
-                        <a:effectLst/>
-                        <a:latin typeface="Calibri" panose="020F0502020204030204" pitchFamily="34" charset="0"/>
-                        <a:ea typeface="Calibri" panose="020F0502020204030204" pitchFamily="34" charset="0"/>
-                        <a:cs typeface="Times New Roman" panose="02020603050405020304" pitchFamily="18" charset="0"/>
-                      </a:endParaRPr>
-                    </a:p>
-                  </a:txBody>
-                  <a:tcPr marL="68580" marR="68580" marT="0" marB="0" anchor="ctr"/>
-                </a:tc>
-                <a:tc>
-                  <a:txBody>
-                    <a:bodyPr/>
-                    <a:lstStyle/>
-                    <a:p>
-                      <a:pPr algn="ctr">
-                        <a:lnSpc>
-                          <a:spcPct val="107000"/>
-                        </a:lnSpc>
-                        <a:spcAft>
-                          <a:spcPts val="0"/>
-                        </a:spcAft>
-                      </a:pPr>
-                      <a:r>
-                        <a:rPr lang="ru-RU" sz="1100">
-                          <a:effectLst/>
-                        </a:rPr>
-                        <a:t>0x0000</a:t>
+                        <a:t>0xFFFF</a:t>
                       </a:r>
                       <a:endParaRPr lang="ru-RU" sz="1100">
                         <a:effectLst/>
@@ -6180,7 +6191,7 @@
                 </a:tc>
                 <a:extLst>
                   <a:ext uri="{0D108BD9-81ED-4DB2-BD59-A6C34878D82A}">
-                    <a16:rowId xmlns="" xmlns:a16="http://schemas.microsoft.com/office/drawing/2014/main" val="1008249115"/>
+                    <a16:rowId xmlns:a16="http://schemas.microsoft.com/office/drawing/2014/main" val="1008249115"/>
                   </a:ext>
                 </a:extLst>
               </a:tr>
@@ -6228,10 +6239,45 @@
                         </a:spcAft>
                       </a:pPr>
                       <a:r>
+                        <a:rPr lang="ru-RU" sz="1100" dirty="0">
+                          <a:effectLst/>
+                          <a:latin typeface="Arial" panose="020B0604020202020204" pitchFamily="34" charset="0"/>
+                          <a:ea typeface="Calibri" panose="020F0502020204030204" pitchFamily="34" charset="0"/>
+                          <a:cs typeface="Times New Roman" panose="02020603050405020304" pitchFamily="18" charset="0"/>
+                        </a:rPr>
+                        <a:t>CCITT-FALSE</a:t>
+                      </a:r>
+                      <a:endParaRPr lang="ru-RU" sz="1100" dirty="0">
+                        <a:effectLst/>
+                        <a:latin typeface="Calibri" panose="020F0502020204030204" pitchFamily="34" charset="0"/>
+                        <a:ea typeface="Calibri" panose="020F0502020204030204" pitchFamily="34" charset="0"/>
+                        <a:cs typeface="Times New Roman" panose="02020603050405020304" pitchFamily="18" charset="0"/>
+                      </a:endParaRPr>
+                    </a:p>
+                  </a:txBody>
+                  <a:tcPr marL="68580" marR="68580" marT="0" marB="0" anchor="ctr"/>
+                </a:tc>
+                <a:tc>
+                  <a:txBody>
+                    <a:bodyPr/>
+                    <a:lstStyle/>
+                    <a:p>
+                      <a:pPr algn="ctr">
+                        <a:lnSpc>
+                          <a:spcPct val="107000"/>
+                        </a:lnSpc>
+                        <a:spcAft>
+                          <a:spcPts val="0"/>
+                        </a:spcAft>
+                      </a:pPr>
+                      <a:r>
                         <a:rPr lang="ru-RU" sz="1100">
                           <a:effectLst/>
+                          <a:latin typeface="Arial" panose="020B0604020202020204" pitchFamily="34" charset="0"/>
+                          <a:ea typeface="Calibri" panose="020F0502020204030204" pitchFamily="34" charset="0"/>
+                          <a:cs typeface="Times New Roman" panose="02020603050405020304" pitchFamily="18" charset="0"/>
                         </a:rPr>
-                        <a:t>CRC-16/ARC</a:t>
+                        <a:t>0x1021</a:t>
                       </a:r>
                       <a:endParaRPr lang="ru-RU" sz="1100">
                         <a:effectLst/>
@@ -6259,8 +6305,11 @@
                       <a:r>
                         <a:rPr lang="ru-RU" sz="1100">
                           <a:effectLst/>
+                          <a:latin typeface="Arial" panose="020B0604020202020204" pitchFamily="34" charset="0"/>
+                          <a:ea typeface="Calibri" panose="020F0502020204030204" pitchFamily="34" charset="0"/>
+                          <a:cs typeface="Times New Roman" panose="02020603050405020304" pitchFamily="18" charset="0"/>
                         </a:rPr>
-                        <a:t>0x8005</a:t>
+                        <a:t>0xFFFF</a:t>
                       </a:r>
                       <a:endParaRPr lang="ru-RU" sz="1100">
                         <a:effectLst/>
@@ -6286,12 +6335,47 @@
                         </a:spcAft>
                       </a:pPr>
                       <a:r>
-                        <a:rPr lang="ru-RU" sz="1100">
+                        <a:rPr lang="en-US" sz="1100" dirty="0">
                           <a:effectLst/>
+                          <a:latin typeface="Arial" panose="020B0604020202020204" pitchFamily="34" charset="0"/>
+                          <a:ea typeface="Calibri" panose="020F0502020204030204" pitchFamily="34" charset="0"/>
+                          <a:cs typeface="Times New Roman" panose="02020603050405020304" pitchFamily="18" charset="0"/>
                         </a:rPr>
-                        <a:t>0x0000</a:t>
+                        <a:t>FALSE</a:t>
                       </a:r>
-                      <a:endParaRPr lang="ru-RU" sz="1100">
+                      <a:endParaRPr lang="ru-RU" sz="1100" dirty="0">
+                        <a:effectLst/>
+                        <a:latin typeface="Calibri" panose="020F0502020204030204" pitchFamily="34" charset="0"/>
+                        <a:ea typeface="Calibri" panose="020F0502020204030204" pitchFamily="34" charset="0"/>
+                        <a:cs typeface="Times New Roman" panose="02020603050405020304" pitchFamily="18" charset="0"/>
+                      </a:endParaRPr>
+                    </a:p>
+                  </a:txBody>
+                  <a:tcPr marL="68580" marR="68580" marT="0" marB="0" anchor="ctr"/>
+                </a:tc>
+                <a:tc>
+                  <a:txBody>
+                    <a:bodyPr/>
+                    <a:lstStyle/>
+                    <a:p>
+                      <a:pPr algn="ctr">
+                        <a:lnSpc>
+                          <a:spcPct val="107000"/>
+                        </a:lnSpc>
+                        <a:spcAft>
+                          <a:spcPts val="0"/>
+                        </a:spcAft>
+                      </a:pPr>
+                      <a:r>
+                        <a:rPr lang="en-US" sz="1100" dirty="0">
+                          <a:effectLst/>
+                          <a:latin typeface="Arial" panose="020B0604020202020204" pitchFamily="34" charset="0"/>
+                          <a:ea typeface="Calibri" panose="020F0502020204030204" pitchFamily="34" charset="0"/>
+                          <a:cs typeface="Times New Roman" panose="02020603050405020304" pitchFamily="18" charset="0"/>
+                        </a:rPr>
+                        <a:t>FALSE</a:t>
+                      </a:r>
+                      <a:endParaRPr lang="ru-RU" sz="1100" dirty="0">
                         <a:effectLst/>
                         <a:latin typeface="Calibri" panose="020F0502020204030204" pitchFamily="34" charset="0"/>
                         <a:ea typeface="Calibri" panose="020F0502020204030204" pitchFamily="34" charset="0"/>
@@ -6317,66 +6401,11 @@
                       <a:r>
                         <a:rPr lang="ru-RU" sz="1100">
                           <a:effectLst/>
+                          <a:latin typeface="Arial" panose="020B0604020202020204" pitchFamily="34" charset="0"/>
+                          <a:ea typeface="Calibri" panose="020F0502020204030204" pitchFamily="34" charset="0"/>
+                          <a:cs typeface="Times New Roman" panose="02020603050405020304" pitchFamily="18" charset="0"/>
                         </a:rPr>
-                        <a:t>TRUE</a:t>
-                      </a:r>
-                      <a:endParaRPr lang="ru-RU" sz="1100">
-                        <a:effectLst/>
-                        <a:latin typeface="Calibri" panose="020F0502020204030204" pitchFamily="34" charset="0"/>
-                        <a:ea typeface="Calibri" panose="020F0502020204030204" pitchFamily="34" charset="0"/>
-                        <a:cs typeface="Times New Roman" panose="02020603050405020304" pitchFamily="18" charset="0"/>
-                      </a:endParaRPr>
-                    </a:p>
-                  </a:txBody>
-                  <a:tcPr marL="68580" marR="68580" marT="0" marB="0" anchor="ctr"/>
-                </a:tc>
-                <a:tc>
-                  <a:txBody>
-                    <a:bodyPr/>
-                    <a:lstStyle/>
-                    <a:p>
-                      <a:pPr algn="ctr">
-                        <a:lnSpc>
-                          <a:spcPct val="107000"/>
-                        </a:lnSpc>
-                        <a:spcAft>
-                          <a:spcPts val="0"/>
-                        </a:spcAft>
-                      </a:pPr>
-                      <a:r>
-                        <a:rPr lang="ru-RU" sz="1100">
-                          <a:effectLst/>
-                        </a:rPr>
-                        <a:t>TRUE</a:t>
-                      </a:r>
-                      <a:endParaRPr lang="ru-RU" sz="1100">
-                        <a:effectLst/>
-                        <a:latin typeface="Calibri" panose="020F0502020204030204" pitchFamily="34" charset="0"/>
-                        <a:ea typeface="Calibri" panose="020F0502020204030204" pitchFamily="34" charset="0"/>
-                        <a:cs typeface="Times New Roman" panose="02020603050405020304" pitchFamily="18" charset="0"/>
-                      </a:endParaRPr>
-                    </a:p>
-                  </a:txBody>
-                  <a:tcPr marL="68580" marR="68580" marT="0" marB="0" anchor="ctr"/>
-                </a:tc>
-                <a:tc>
-                  <a:txBody>
-                    <a:bodyPr/>
-                    <a:lstStyle/>
-                    <a:p>
-                      <a:pPr algn="ctr">
-                        <a:lnSpc>
-                          <a:spcPct val="107000"/>
-                        </a:lnSpc>
-                        <a:spcAft>
-                          <a:spcPts val="0"/>
-                        </a:spcAft>
-                      </a:pPr>
-                      <a:r>
-                        <a:rPr lang="ru-RU" sz="1100">
-                          <a:effectLst/>
-                        </a:rPr>
-                        <a:t>0xFFFF</a:t>
+                        <a:t>0x0000</a:t>
                       </a:r>
                       <a:endParaRPr lang="ru-RU" sz="1100">
                         <a:effectLst/>
@@ -6390,7 +6419,7 @@
                 </a:tc>
                 <a:extLst>
                   <a:ext uri="{0D108BD9-81ED-4DB2-BD59-A6C34878D82A}">
-                    <a16:rowId xmlns="" xmlns:a16="http://schemas.microsoft.com/office/drawing/2014/main" val="3304276399"/>
+                    <a16:rowId xmlns:a16="http://schemas.microsoft.com/office/drawing/2014/main" val="3304276399"/>
                   </a:ext>
                 </a:extLst>
               </a:tr>
@@ -6438,12 +6467,15 @@
                         </a:spcAft>
                       </a:pPr>
                       <a:r>
-                        <a:rPr lang="ru-RU" sz="1100">
+                        <a:rPr lang="ru-RU" sz="1100" dirty="0">
                           <a:effectLst/>
+                          <a:latin typeface="Arial" panose="020B0604020202020204" pitchFamily="34" charset="0"/>
+                          <a:ea typeface="Calibri" panose="020F0502020204030204" pitchFamily="34" charset="0"/>
+                          <a:cs typeface="Times New Roman" panose="02020603050405020304" pitchFamily="18" charset="0"/>
                         </a:rPr>
-                        <a:t>CRC-16/AUG-CCITT</a:t>
+                        <a:t>ARC</a:t>
                       </a:r>
-                      <a:endParaRPr lang="ru-RU" sz="1100">
+                      <a:endParaRPr lang="ru-RU" sz="1100" dirty="0">
                         <a:effectLst/>
                         <a:latin typeface="Calibri" panose="020F0502020204030204" pitchFamily="34" charset="0"/>
                         <a:ea typeface="Calibri" panose="020F0502020204030204" pitchFamily="34" charset="0"/>
@@ -6469,6 +6501,9 @@
                       <a:r>
                         <a:rPr lang="ru-RU" sz="1100">
                           <a:effectLst/>
+                          <a:latin typeface="Arial" panose="020B0604020202020204" pitchFamily="34" charset="0"/>
+                          <a:ea typeface="Calibri" panose="020F0502020204030204" pitchFamily="34" charset="0"/>
+                          <a:cs typeface="Times New Roman" panose="02020603050405020304" pitchFamily="18" charset="0"/>
                         </a:rPr>
                         <a:t>0x8005</a:t>
                       </a:r>
@@ -6498,6 +6533,9 @@
                       <a:r>
                         <a:rPr lang="ru-RU" sz="1100">
                           <a:effectLst/>
+                          <a:latin typeface="Arial" panose="020B0604020202020204" pitchFamily="34" charset="0"/>
+                          <a:ea typeface="Calibri" panose="020F0502020204030204" pitchFamily="34" charset="0"/>
+                          <a:cs typeface="Times New Roman" panose="02020603050405020304" pitchFamily="18" charset="0"/>
                         </a:rPr>
                         <a:t>0x0000</a:t>
                       </a:r>
@@ -6525,12 +6563,47 @@
                         </a:spcAft>
                       </a:pPr>
                       <a:r>
-                        <a:rPr lang="ru-RU" sz="1100">
+                        <a:rPr lang="en-US" sz="1100" dirty="0">
                           <a:effectLst/>
+                          <a:latin typeface="Arial" panose="020B0604020202020204" pitchFamily="34" charset="0"/>
+                          <a:ea typeface="Calibri" panose="020F0502020204030204" pitchFamily="34" charset="0"/>
+                          <a:cs typeface="Times New Roman" panose="02020603050405020304" pitchFamily="18" charset="0"/>
                         </a:rPr>
                         <a:t>TRUE</a:t>
                       </a:r>
-                      <a:endParaRPr lang="ru-RU" sz="1100">
+                      <a:endParaRPr lang="ru-RU" sz="1100" dirty="0">
+                        <a:effectLst/>
+                        <a:latin typeface="Calibri" panose="020F0502020204030204" pitchFamily="34" charset="0"/>
+                        <a:ea typeface="Calibri" panose="020F0502020204030204" pitchFamily="34" charset="0"/>
+                        <a:cs typeface="Times New Roman" panose="02020603050405020304" pitchFamily="18" charset="0"/>
+                      </a:endParaRPr>
+                    </a:p>
+                  </a:txBody>
+                  <a:tcPr marL="68580" marR="68580" marT="0" marB="0" anchor="ctr"/>
+                </a:tc>
+                <a:tc>
+                  <a:txBody>
+                    <a:bodyPr/>
+                    <a:lstStyle/>
+                    <a:p>
+                      <a:pPr algn="ctr">
+                        <a:lnSpc>
+                          <a:spcPct val="107000"/>
+                        </a:lnSpc>
+                        <a:spcAft>
+                          <a:spcPts val="0"/>
+                        </a:spcAft>
+                      </a:pPr>
+                      <a:r>
+                        <a:rPr lang="en-US" sz="1100" dirty="0">
+                          <a:effectLst/>
+                          <a:latin typeface="Arial" panose="020B0604020202020204" pitchFamily="34" charset="0"/>
+                          <a:ea typeface="Calibri" panose="020F0502020204030204" pitchFamily="34" charset="0"/>
+                          <a:cs typeface="Times New Roman" panose="02020603050405020304" pitchFamily="18" charset="0"/>
+                        </a:rPr>
+                        <a:t>TRUE</a:t>
+                      </a:r>
+                      <a:endParaRPr lang="ru-RU" sz="1100" dirty="0">
                         <a:effectLst/>
                         <a:latin typeface="Calibri" panose="020F0502020204030204" pitchFamily="34" charset="0"/>
                         <a:ea typeface="Calibri" panose="020F0502020204030204" pitchFamily="34" charset="0"/>
@@ -6556,35 +6629,9 @@
                       <a:r>
                         <a:rPr lang="ru-RU" sz="1100">
                           <a:effectLst/>
-                        </a:rPr>
-                        <a:t>TRUE</a:t>
-                      </a:r>
-                      <a:endParaRPr lang="ru-RU" sz="1100">
-                        <a:effectLst/>
-                        <a:latin typeface="Calibri" panose="020F0502020204030204" pitchFamily="34" charset="0"/>
-                        <a:ea typeface="Calibri" panose="020F0502020204030204" pitchFamily="34" charset="0"/>
-                        <a:cs typeface="Times New Roman" panose="02020603050405020304" pitchFamily="18" charset="0"/>
-                      </a:endParaRPr>
-                    </a:p>
-                  </a:txBody>
-                  <a:tcPr marL="68580" marR="68580" marT="0" marB="0" anchor="ctr"/>
-                </a:tc>
-                <a:tc>
-                  <a:txBody>
-                    <a:bodyPr/>
-                    <a:lstStyle/>
-                    <a:p>
-                      <a:pPr algn="ctr">
-                        <a:lnSpc>
-                          <a:spcPct val="107000"/>
-                        </a:lnSpc>
-                        <a:spcAft>
-                          <a:spcPts val="0"/>
-                        </a:spcAft>
-                      </a:pPr>
-                      <a:r>
-                        <a:rPr lang="ru-RU" sz="1100">
-                          <a:effectLst/>
+                          <a:latin typeface="Arial" panose="020B0604020202020204" pitchFamily="34" charset="0"/>
+                          <a:ea typeface="Calibri" panose="020F0502020204030204" pitchFamily="34" charset="0"/>
+                          <a:cs typeface="Times New Roman" panose="02020603050405020304" pitchFamily="18" charset="0"/>
                         </a:rPr>
                         <a:t>0x0000</a:t>
                       </a:r>
@@ -6600,7 +6647,7 @@
                 </a:tc>
                 <a:extLst>
                   <a:ext uri="{0D108BD9-81ED-4DB2-BD59-A6C34878D82A}">
-                    <a16:rowId xmlns="" xmlns:a16="http://schemas.microsoft.com/office/drawing/2014/main" val="2482474577"/>
+                    <a16:rowId xmlns:a16="http://schemas.microsoft.com/office/drawing/2014/main" val="2482474577"/>
                   </a:ext>
                 </a:extLst>
               </a:tr>
@@ -6648,12 +6695,15 @@
                         </a:spcAft>
                       </a:pPr>
                       <a:r>
-                        <a:rPr lang="ru-RU" sz="1100">
+                        <a:rPr lang="ru-RU" sz="1100" dirty="0">
                           <a:effectLst/>
+                          <a:latin typeface="Arial" panose="020B0604020202020204" pitchFamily="34" charset="0"/>
+                          <a:ea typeface="Calibri" panose="020F0502020204030204" pitchFamily="34" charset="0"/>
+                          <a:cs typeface="Times New Roman" panose="02020603050405020304" pitchFamily="18" charset="0"/>
                         </a:rPr>
-                        <a:t>CRC-16/BUYPASS</a:t>
+                        <a:t>AUG-CCITT</a:t>
                       </a:r>
-                      <a:endParaRPr lang="ru-RU" sz="1100">
+                      <a:endParaRPr lang="ru-RU" sz="1100" dirty="0">
                         <a:effectLst/>
                         <a:latin typeface="Calibri" panose="020F0502020204030204" pitchFamily="34" charset="0"/>
                         <a:ea typeface="Calibri" panose="020F0502020204030204" pitchFamily="34" charset="0"/>
@@ -6679,6 +6729,9 @@
                       <a:r>
                         <a:rPr lang="ru-RU" sz="1100">
                           <a:effectLst/>
+                          <a:latin typeface="Arial" panose="020B0604020202020204" pitchFamily="34" charset="0"/>
+                          <a:ea typeface="Calibri" panose="020F0502020204030204" pitchFamily="34" charset="0"/>
+                          <a:cs typeface="Times New Roman" panose="02020603050405020304" pitchFamily="18" charset="0"/>
                         </a:rPr>
                         <a:t>0x1021</a:t>
                       </a:r>
@@ -6708,6 +6761,9 @@
                       <a:r>
                         <a:rPr lang="ru-RU" sz="1100">
                           <a:effectLst/>
+                          <a:latin typeface="Arial" panose="020B0604020202020204" pitchFamily="34" charset="0"/>
+                          <a:ea typeface="Calibri" panose="020F0502020204030204" pitchFamily="34" charset="0"/>
+                          <a:cs typeface="Times New Roman" panose="02020603050405020304" pitchFamily="18" charset="0"/>
                         </a:rPr>
                         <a:t>0x1D0F</a:t>
                       </a:r>
@@ -6735,8 +6791,59 @@
                         </a:spcAft>
                       </a:pPr>
                       <a:r>
-                        <a:rPr lang="ru-RU" sz="1100">
+                        <a:rPr kumimoji="0" lang="en-US" sz="1100" b="0" i="0" u="none" strike="noStrike" kern="1200" cap="none" spc="0" normalizeH="0" baseline="0" noProof="0">
+                          <a:ln>
+                            <a:noFill/>
+                          </a:ln>
+                          <a:solidFill>
+                            <a:srgbClr val="292934"/>
+                          </a:solidFill>
                           <a:effectLst/>
+                          <a:uLnTx/>
+                          <a:uFillTx/>
+                          <a:latin typeface="Arial" panose="020B0604020202020204" pitchFamily="34" charset="0"/>
+                          <a:ea typeface="Calibri" panose="020F0502020204030204" pitchFamily="34" charset="0"/>
+                          <a:cs typeface="Times New Roman" panose="02020603050405020304" pitchFamily="18" charset="0"/>
+                        </a:rPr>
+                        <a:t>FALSE</a:t>
+                      </a:r>
+                      <a:endParaRPr lang="ru-RU" sz="1100" dirty="0">
+                        <a:effectLst/>
+                        <a:latin typeface="Calibri" panose="020F0502020204030204" pitchFamily="34" charset="0"/>
+                        <a:ea typeface="Calibri" panose="020F0502020204030204" pitchFamily="34" charset="0"/>
+                        <a:cs typeface="Times New Roman" panose="02020603050405020304" pitchFamily="18" charset="0"/>
+                      </a:endParaRPr>
+                    </a:p>
+                  </a:txBody>
+                  <a:tcPr marL="68580" marR="68580" marT="0" marB="0" anchor="ctr"/>
+                </a:tc>
+                <a:tc>
+                  <a:txBody>
+                    <a:bodyPr/>
+                    <a:lstStyle/>
+                    <a:p>
+                      <a:pPr algn="ctr">
+                        <a:lnSpc>
+                          <a:spcPct val="107000"/>
+                        </a:lnSpc>
+                        <a:spcAft>
+                          <a:spcPts val="0"/>
+                        </a:spcAft>
+                      </a:pPr>
+                      <a:r>
+                        <a:rPr kumimoji="0" lang="en-US" sz="1100" b="0" i="0" u="none" strike="noStrike" kern="1200" cap="none" spc="0" normalizeH="0" baseline="0" noProof="0">
+                          <a:ln>
+                            <a:noFill/>
+                          </a:ln>
+                          <a:solidFill>
+                            <a:srgbClr val="292934"/>
+                          </a:solidFill>
+                          <a:effectLst/>
+                          <a:uLnTx/>
+                          <a:uFillTx/>
+                          <a:latin typeface="Arial" panose="020B0604020202020204" pitchFamily="34" charset="0"/>
+                          <a:ea typeface="Calibri" panose="020F0502020204030204" pitchFamily="34" charset="0"/>
+                          <a:cs typeface="Times New Roman" panose="02020603050405020304" pitchFamily="18" charset="0"/>
                         </a:rPr>
                         <a:t>FALSE</a:t>
                       </a:r>
@@ -6766,35 +6873,9 @@
                       <a:r>
                         <a:rPr lang="ru-RU" sz="1100">
                           <a:effectLst/>
-                        </a:rPr>
-                        <a:t>FALSE</a:t>
-                      </a:r>
-                      <a:endParaRPr lang="ru-RU" sz="1100">
-                        <a:effectLst/>
-                        <a:latin typeface="Calibri" panose="020F0502020204030204" pitchFamily="34" charset="0"/>
-                        <a:ea typeface="Calibri" panose="020F0502020204030204" pitchFamily="34" charset="0"/>
-                        <a:cs typeface="Times New Roman" panose="02020603050405020304" pitchFamily="18" charset="0"/>
-                      </a:endParaRPr>
-                    </a:p>
-                  </a:txBody>
-                  <a:tcPr marL="68580" marR="68580" marT="0" marB="0" anchor="ctr"/>
-                </a:tc>
-                <a:tc>
-                  <a:txBody>
-                    <a:bodyPr/>
-                    <a:lstStyle/>
-                    <a:p>
-                      <a:pPr algn="ctr">
-                        <a:lnSpc>
-                          <a:spcPct val="107000"/>
-                        </a:lnSpc>
-                        <a:spcAft>
-                          <a:spcPts val="0"/>
-                        </a:spcAft>
-                      </a:pPr>
-                      <a:r>
-                        <a:rPr lang="ru-RU" sz="1100">
-                          <a:effectLst/>
+                          <a:latin typeface="Arial" panose="020B0604020202020204" pitchFamily="34" charset="0"/>
+                          <a:ea typeface="Calibri" panose="020F0502020204030204" pitchFamily="34" charset="0"/>
+                          <a:cs typeface="Times New Roman" panose="02020603050405020304" pitchFamily="18" charset="0"/>
                         </a:rPr>
                         <a:t>0x0000</a:t>
                       </a:r>
@@ -6810,7 +6891,7 @@
                 </a:tc>
                 <a:extLst>
                   <a:ext uri="{0D108BD9-81ED-4DB2-BD59-A6C34878D82A}">
-                    <a16:rowId xmlns="" xmlns:a16="http://schemas.microsoft.com/office/drawing/2014/main" val="3673785524"/>
+                    <a16:rowId xmlns:a16="http://schemas.microsoft.com/office/drawing/2014/main" val="3673785524"/>
                   </a:ext>
                 </a:extLst>
               </a:tr>
@@ -6858,12 +6939,15 @@
                         </a:spcAft>
                       </a:pPr>
                       <a:r>
-                        <a:rPr lang="ru-RU" sz="1100">
+                        <a:rPr lang="ru-RU" sz="1100" dirty="0">
                           <a:effectLst/>
+                          <a:latin typeface="Arial" panose="020B0604020202020204" pitchFamily="34" charset="0"/>
+                          <a:ea typeface="Calibri" panose="020F0502020204030204" pitchFamily="34" charset="0"/>
+                          <a:cs typeface="Times New Roman" panose="02020603050405020304" pitchFamily="18" charset="0"/>
                         </a:rPr>
-                        <a:t>CRC-16/CDMA2000</a:t>
+                        <a:t>BUYPASS</a:t>
                       </a:r>
-                      <a:endParaRPr lang="ru-RU" sz="1100">
+                      <a:endParaRPr lang="ru-RU" sz="1100" dirty="0">
                         <a:effectLst/>
                         <a:latin typeface="Calibri" panose="020F0502020204030204" pitchFamily="34" charset="0"/>
                         <a:ea typeface="Calibri" panose="020F0502020204030204" pitchFamily="34" charset="0"/>
@@ -6889,6 +6973,9 @@
                       <a:r>
                         <a:rPr lang="ru-RU" sz="1100">
                           <a:effectLst/>
+                          <a:latin typeface="Arial" panose="020B0604020202020204" pitchFamily="34" charset="0"/>
+                          <a:ea typeface="Calibri" panose="020F0502020204030204" pitchFamily="34" charset="0"/>
+                          <a:cs typeface="Times New Roman" panose="02020603050405020304" pitchFamily="18" charset="0"/>
                         </a:rPr>
                         <a:t>0x8005</a:t>
                       </a:r>
@@ -6918,6 +7005,9 @@
                       <a:r>
                         <a:rPr lang="ru-RU" sz="1100">
                           <a:effectLst/>
+                          <a:latin typeface="Arial" panose="020B0604020202020204" pitchFamily="34" charset="0"/>
+                          <a:ea typeface="Calibri" panose="020F0502020204030204" pitchFamily="34" charset="0"/>
+                          <a:cs typeface="Times New Roman" panose="02020603050405020304" pitchFamily="18" charset="0"/>
                         </a:rPr>
                         <a:t>0x0000</a:t>
                       </a:r>
@@ -6945,8 +7035,59 @@
                         </a:spcAft>
                       </a:pPr>
                       <a:r>
-                        <a:rPr lang="ru-RU" sz="1100">
+                        <a:rPr kumimoji="0" lang="en-US" sz="1100" b="0" i="0" u="none" strike="noStrike" kern="1200" cap="none" spc="0" normalizeH="0" baseline="0" noProof="0">
+                          <a:ln>
+                            <a:noFill/>
+                          </a:ln>
+                          <a:solidFill>
+                            <a:srgbClr val="292934"/>
+                          </a:solidFill>
                           <a:effectLst/>
+                          <a:uLnTx/>
+                          <a:uFillTx/>
+                          <a:latin typeface="Arial" panose="020B0604020202020204" pitchFamily="34" charset="0"/>
+                          <a:ea typeface="Calibri" panose="020F0502020204030204" pitchFamily="34" charset="0"/>
+                          <a:cs typeface="Times New Roman" panose="02020603050405020304" pitchFamily="18" charset="0"/>
+                        </a:rPr>
+                        <a:t>FALSE</a:t>
+                      </a:r>
+                      <a:endParaRPr lang="ru-RU" sz="1100" dirty="0">
+                        <a:effectLst/>
+                        <a:latin typeface="Calibri" panose="020F0502020204030204" pitchFamily="34" charset="0"/>
+                        <a:ea typeface="Calibri" panose="020F0502020204030204" pitchFamily="34" charset="0"/>
+                        <a:cs typeface="Times New Roman" panose="02020603050405020304" pitchFamily="18" charset="0"/>
+                      </a:endParaRPr>
+                    </a:p>
+                  </a:txBody>
+                  <a:tcPr marL="68580" marR="68580" marT="0" marB="0" anchor="ctr"/>
+                </a:tc>
+                <a:tc>
+                  <a:txBody>
+                    <a:bodyPr/>
+                    <a:lstStyle/>
+                    <a:p>
+                      <a:pPr algn="ctr">
+                        <a:lnSpc>
+                          <a:spcPct val="107000"/>
+                        </a:lnSpc>
+                        <a:spcAft>
+                          <a:spcPts val="0"/>
+                        </a:spcAft>
+                      </a:pPr>
+                      <a:r>
+                        <a:rPr kumimoji="0" lang="en-US" sz="1100" b="0" i="0" u="none" strike="noStrike" kern="1200" cap="none" spc="0" normalizeH="0" baseline="0" noProof="0">
+                          <a:ln>
+                            <a:noFill/>
+                          </a:ln>
+                          <a:solidFill>
+                            <a:srgbClr val="292934"/>
+                          </a:solidFill>
+                          <a:effectLst/>
+                          <a:uLnTx/>
+                          <a:uFillTx/>
+                          <a:latin typeface="Arial" panose="020B0604020202020204" pitchFamily="34" charset="0"/>
+                          <a:ea typeface="Calibri" panose="020F0502020204030204" pitchFamily="34" charset="0"/>
+                          <a:cs typeface="Times New Roman" panose="02020603050405020304" pitchFamily="18" charset="0"/>
                         </a:rPr>
                         <a:t>FALSE</a:t>
                       </a:r>
@@ -6976,35 +7117,9 @@
                       <a:r>
                         <a:rPr lang="ru-RU" sz="1100">
                           <a:effectLst/>
-                        </a:rPr>
-                        <a:t>FALSE</a:t>
-                      </a:r>
-                      <a:endParaRPr lang="ru-RU" sz="1100">
-                        <a:effectLst/>
-                        <a:latin typeface="Calibri" panose="020F0502020204030204" pitchFamily="34" charset="0"/>
-                        <a:ea typeface="Calibri" panose="020F0502020204030204" pitchFamily="34" charset="0"/>
-                        <a:cs typeface="Times New Roman" panose="02020603050405020304" pitchFamily="18" charset="0"/>
-                      </a:endParaRPr>
-                    </a:p>
-                  </a:txBody>
-                  <a:tcPr marL="68580" marR="68580" marT="0" marB="0" anchor="ctr"/>
-                </a:tc>
-                <a:tc>
-                  <a:txBody>
-                    <a:bodyPr/>
-                    <a:lstStyle/>
-                    <a:p>
-                      <a:pPr algn="ctr">
-                        <a:lnSpc>
-                          <a:spcPct val="107000"/>
-                        </a:lnSpc>
-                        <a:spcAft>
-                          <a:spcPts val="0"/>
-                        </a:spcAft>
-                      </a:pPr>
-                      <a:r>
-                        <a:rPr lang="ru-RU" sz="1100">
-                          <a:effectLst/>
+                          <a:latin typeface="Arial" panose="020B0604020202020204" pitchFamily="34" charset="0"/>
+                          <a:ea typeface="Calibri" panose="020F0502020204030204" pitchFamily="34" charset="0"/>
+                          <a:cs typeface="Times New Roman" panose="02020603050405020304" pitchFamily="18" charset="0"/>
                         </a:rPr>
                         <a:t>0x0000</a:t>
                       </a:r>
@@ -7020,7 +7135,7 @@
                 </a:tc>
                 <a:extLst>
                   <a:ext uri="{0D108BD9-81ED-4DB2-BD59-A6C34878D82A}">
-                    <a16:rowId xmlns="" xmlns:a16="http://schemas.microsoft.com/office/drawing/2014/main" val="1035707647"/>
+                    <a16:rowId xmlns:a16="http://schemas.microsoft.com/office/drawing/2014/main" val="1035707647"/>
                   </a:ext>
                 </a:extLst>
               </a:tr>
@@ -7068,12 +7183,15 @@
                         </a:spcAft>
                       </a:pPr>
                       <a:r>
-                        <a:rPr lang="ru-RU" sz="1100">
+                        <a:rPr lang="ru-RU" sz="1100" dirty="0">
                           <a:effectLst/>
+                          <a:latin typeface="Arial" panose="020B0604020202020204" pitchFamily="34" charset="0"/>
+                          <a:ea typeface="Calibri" panose="020F0502020204030204" pitchFamily="34" charset="0"/>
+                          <a:cs typeface="Times New Roman" panose="02020603050405020304" pitchFamily="18" charset="0"/>
                         </a:rPr>
-                        <a:t>CRC-16/DDS-110</a:t>
+                        <a:t>CDMA2000</a:t>
                       </a:r>
-                      <a:endParaRPr lang="ru-RU" sz="1100">
+                      <a:endParaRPr lang="ru-RU" sz="1100" dirty="0">
                         <a:effectLst/>
                         <a:latin typeface="Calibri" panose="020F0502020204030204" pitchFamily="34" charset="0"/>
                         <a:ea typeface="Calibri" panose="020F0502020204030204" pitchFamily="34" charset="0"/>
@@ -7099,6 +7217,9 @@
                       <a:r>
                         <a:rPr lang="ru-RU" sz="1100">
                           <a:effectLst/>
+                          <a:latin typeface="Arial" panose="020B0604020202020204" pitchFamily="34" charset="0"/>
+                          <a:ea typeface="Calibri" panose="020F0502020204030204" pitchFamily="34" charset="0"/>
+                          <a:cs typeface="Times New Roman" panose="02020603050405020304" pitchFamily="18" charset="0"/>
                         </a:rPr>
                         <a:t>0xC867</a:t>
                       </a:r>
@@ -7128,6 +7249,9 @@
                       <a:r>
                         <a:rPr lang="ru-RU" sz="1100">
                           <a:effectLst/>
+                          <a:latin typeface="Arial" panose="020B0604020202020204" pitchFamily="34" charset="0"/>
+                          <a:ea typeface="Calibri" panose="020F0502020204030204" pitchFamily="34" charset="0"/>
+                          <a:cs typeface="Times New Roman" panose="02020603050405020304" pitchFamily="18" charset="0"/>
                         </a:rPr>
                         <a:t>0xFFFF</a:t>
                       </a:r>
@@ -7155,8 +7279,59 @@
                         </a:spcAft>
                       </a:pPr>
                       <a:r>
-                        <a:rPr lang="ru-RU" sz="1100">
+                        <a:rPr kumimoji="0" lang="en-US" sz="1100" b="0" i="0" u="none" strike="noStrike" kern="1200" cap="none" spc="0" normalizeH="0" baseline="0" noProof="0">
+                          <a:ln>
+                            <a:noFill/>
+                          </a:ln>
+                          <a:solidFill>
+                            <a:srgbClr val="292934"/>
+                          </a:solidFill>
                           <a:effectLst/>
+                          <a:uLnTx/>
+                          <a:uFillTx/>
+                          <a:latin typeface="Arial" panose="020B0604020202020204" pitchFamily="34" charset="0"/>
+                          <a:ea typeface="Calibri" panose="020F0502020204030204" pitchFamily="34" charset="0"/>
+                          <a:cs typeface="Times New Roman" panose="02020603050405020304" pitchFamily="18" charset="0"/>
+                        </a:rPr>
+                        <a:t>FALSE</a:t>
+                      </a:r>
+                      <a:endParaRPr lang="ru-RU" sz="1100" dirty="0">
+                        <a:effectLst/>
+                        <a:latin typeface="Calibri" panose="020F0502020204030204" pitchFamily="34" charset="0"/>
+                        <a:ea typeface="Calibri" panose="020F0502020204030204" pitchFamily="34" charset="0"/>
+                        <a:cs typeface="Times New Roman" panose="02020603050405020304" pitchFamily="18" charset="0"/>
+                      </a:endParaRPr>
+                    </a:p>
+                  </a:txBody>
+                  <a:tcPr marL="68580" marR="68580" marT="0" marB="0" anchor="ctr"/>
+                </a:tc>
+                <a:tc>
+                  <a:txBody>
+                    <a:bodyPr/>
+                    <a:lstStyle/>
+                    <a:p>
+                      <a:pPr algn="ctr">
+                        <a:lnSpc>
+                          <a:spcPct val="107000"/>
+                        </a:lnSpc>
+                        <a:spcAft>
+                          <a:spcPts val="0"/>
+                        </a:spcAft>
+                      </a:pPr>
+                      <a:r>
+                        <a:rPr kumimoji="0" lang="en-US" sz="1100" b="0" i="0" u="none" strike="noStrike" kern="1200" cap="none" spc="0" normalizeH="0" baseline="0" noProof="0">
+                          <a:ln>
+                            <a:noFill/>
+                          </a:ln>
+                          <a:solidFill>
+                            <a:srgbClr val="292934"/>
+                          </a:solidFill>
+                          <a:effectLst/>
+                          <a:uLnTx/>
+                          <a:uFillTx/>
+                          <a:latin typeface="Arial" panose="020B0604020202020204" pitchFamily="34" charset="0"/>
+                          <a:ea typeface="Calibri" panose="020F0502020204030204" pitchFamily="34" charset="0"/>
+                          <a:cs typeface="Times New Roman" panose="02020603050405020304" pitchFamily="18" charset="0"/>
                         </a:rPr>
                         <a:t>FALSE</a:t>
                       </a:r>
@@ -7186,35 +7361,9 @@
                       <a:r>
                         <a:rPr lang="ru-RU" sz="1100">
                           <a:effectLst/>
-                        </a:rPr>
-                        <a:t>FALSE</a:t>
-                      </a:r>
-                      <a:endParaRPr lang="ru-RU" sz="1100">
-                        <a:effectLst/>
-                        <a:latin typeface="Calibri" panose="020F0502020204030204" pitchFamily="34" charset="0"/>
-                        <a:ea typeface="Calibri" panose="020F0502020204030204" pitchFamily="34" charset="0"/>
-                        <a:cs typeface="Times New Roman" panose="02020603050405020304" pitchFamily="18" charset="0"/>
-                      </a:endParaRPr>
-                    </a:p>
-                  </a:txBody>
-                  <a:tcPr marL="68580" marR="68580" marT="0" marB="0" anchor="ctr"/>
-                </a:tc>
-                <a:tc>
-                  <a:txBody>
-                    <a:bodyPr/>
-                    <a:lstStyle/>
-                    <a:p>
-                      <a:pPr algn="ctr">
-                        <a:lnSpc>
-                          <a:spcPct val="107000"/>
-                        </a:lnSpc>
-                        <a:spcAft>
-                          <a:spcPts val="0"/>
-                        </a:spcAft>
-                      </a:pPr>
-                      <a:r>
-                        <a:rPr lang="ru-RU" sz="1100">
-                          <a:effectLst/>
+                          <a:latin typeface="Arial" panose="020B0604020202020204" pitchFamily="34" charset="0"/>
+                          <a:ea typeface="Calibri" panose="020F0502020204030204" pitchFamily="34" charset="0"/>
+                          <a:cs typeface="Times New Roman" panose="02020603050405020304" pitchFamily="18" charset="0"/>
                         </a:rPr>
                         <a:t>0x0000</a:t>
                       </a:r>
@@ -7230,7 +7379,7 @@
                 </a:tc>
                 <a:extLst>
                   <a:ext uri="{0D108BD9-81ED-4DB2-BD59-A6C34878D82A}">
-                    <a16:rowId xmlns="" xmlns:a16="http://schemas.microsoft.com/office/drawing/2014/main" val="1672052466"/>
+                    <a16:rowId xmlns:a16="http://schemas.microsoft.com/office/drawing/2014/main" val="1672052466"/>
                   </a:ext>
                 </a:extLst>
               </a:tr>
@@ -7278,12 +7427,15 @@
                         </a:spcAft>
                       </a:pPr>
                       <a:r>
-                        <a:rPr lang="ru-RU" sz="1100">
+                        <a:rPr lang="ru-RU" sz="1100" dirty="0">
                           <a:effectLst/>
+                          <a:latin typeface="Arial" panose="020B0604020202020204" pitchFamily="34" charset="0"/>
+                          <a:ea typeface="Calibri" panose="020F0502020204030204" pitchFamily="34" charset="0"/>
+                          <a:cs typeface="Times New Roman" panose="02020603050405020304" pitchFamily="18" charset="0"/>
                         </a:rPr>
-                        <a:t>CRC-16/DECT-R</a:t>
+                        <a:t>DDS-110</a:t>
                       </a:r>
-                      <a:endParaRPr lang="ru-RU" sz="1100">
+                      <a:endParaRPr lang="ru-RU" sz="1100" dirty="0">
                         <a:effectLst/>
                         <a:latin typeface="Calibri" panose="020F0502020204030204" pitchFamily="34" charset="0"/>
                         <a:ea typeface="Calibri" panose="020F0502020204030204" pitchFamily="34" charset="0"/>
@@ -7309,6 +7461,9 @@
                       <a:r>
                         <a:rPr lang="ru-RU" sz="1100">
                           <a:effectLst/>
+                          <a:latin typeface="Arial" panose="020B0604020202020204" pitchFamily="34" charset="0"/>
+                          <a:ea typeface="Calibri" panose="020F0502020204030204" pitchFamily="34" charset="0"/>
+                          <a:cs typeface="Times New Roman" panose="02020603050405020304" pitchFamily="18" charset="0"/>
                         </a:rPr>
                         <a:t>0x8005</a:t>
                       </a:r>
@@ -7338,6 +7493,9 @@
                       <a:r>
                         <a:rPr lang="ru-RU" sz="1100">
                           <a:effectLst/>
+                          <a:latin typeface="Arial" panose="020B0604020202020204" pitchFamily="34" charset="0"/>
+                          <a:ea typeface="Calibri" panose="020F0502020204030204" pitchFamily="34" charset="0"/>
+                          <a:cs typeface="Times New Roman" panose="02020603050405020304" pitchFamily="18" charset="0"/>
                         </a:rPr>
                         <a:t>0x800D</a:t>
                       </a:r>
@@ -7365,8 +7523,19 @@
                         </a:spcAft>
                       </a:pPr>
                       <a:r>
-                        <a:rPr lang="ru-RU" sz="1100">
+                        <a:rPr kumimoji="0" lang="en-US" sz="1100" b="0" i="0" u="none" strike="noStrike" kern="1200" cap="none" spc="0" normalizeH="0" baseline="0" noProof="0">
+                          <a:ln>
+                            <a:noFill/>
+                          </a:ln>
+                          <a:solidFill>
+                            <a:srgbClr val="292934"/>
+                          </a:solidFill>
                           <a:effectLst/>
+                          <a:uLnTx/>
+                          <a:uFillTx/>
+                          <a:latin typeface="Arial" panose="020B0604020202020204" pitchFamily="34" charset="0"/>
+                          <a:ea typeface="Calibri" panose="020F0502020204030204" pitchFamily="34" charset="0"/>
+                          <a:cs typeface="Times New Roman" panose="02020603050405020304" pitchFamily="18" charset="0"/>
                         </a:rPr>
                         <a:t>FALSE</a:t>
                       </a:r>
@@ -7394,12 +7563,23 @@
                         </a:spcAft>
                       </a:pPr>
                       <a:r>
-                        <a:rPr lang="ru-RU" sz="1100">
+                        <a:rPr kumimoji="0" lang="en-US" sz="1100" b="0" i="0" u="none" strike="noStrike" kern="1200" cap="none" spc="0" normalizeH="0" baseline="0" noProof="0">
+                          <a:ln>
+                            <a:noFill/>
+                          </a:ln>
+                          <a:solidFill>
+                            <a:srgbClr val="292934"/>
+                          </a:solidFill>
                           <a:effectLst/>
+                          <a:uLnTx/>
+                          <a:uFillTx/>
+                          <a:latin typeface="Arial" panose="020B0604020202020204" pitchFamily="34" charset="0"/>
+                          <a:ea typeface="Calibri" panose="020F0502020204030204" pitchFamily="34" charset="0"/>
+                          <a:cs typeface="Times New Roman" panose="02020603050405020304" pitchFamily="18" charset="0"/>
                         </a:rPr>
                         <a:t>FALSE</a:t>
                       </a:r>
-                      <a:endParaRPr lang="ru-RU" sz="1100">
+                      <a:endParaRPr lang="ru-RU" sz="1100" dirty="0">
                         <a:effectLst/>
                         <a:latin typeface="Calibri" panose="020F0502020204030204" pitchFamily="34" charset="0"/>
                         <a:ea typeface="Calibri" panose="020F0502020204030204" pitchFamily="34" charset="0"/>
@@ -7425,6 +7605,9 @@
                       <a:r>
                         <a:rPr lang="ru-RU" sz="1100">
                           <a:effectLst/>
+                          <a:latin typeface="Arial" panose="020B0604020202020204" pitchFamily="34" charset="0"/>
+                          <a:ea typeface="Calibri" panose="020F0502020204030204" pitchFamily="34" charset="0"/>
+                          <a:cs typeface="Times New Roman" panose="02020603050405020304" pitchFamily="18" charset="0"/>
                         </a:rPr>
                         <a:t>0x0000</a:t>
                       </a:r>
@@ -7440,7 +7623,7 @@
                 </a:tc>
                 <a:extLst>
                   <a:ext uri="{0D108BD9-81ED-4DB2-BD59-A6C34878D82A}">
-                    <a16:rowId xmlns="" xmlns:a16="http://schemas.microsoft.com/office/drawing/2014/main" val="3671735960"/>
+                    <a16:rowId xmlns:a16="http://schemas.microsoft.com/office/drawing/2014/main" val="3671735960"/>
                   </a:ext>
                 </a:extLst>
               </a:tr>
@@ -7488,12 +7671,15 @@
                         </a:spcAft>
                       </a:pPr>
                       <a:r>
-                        <a:rPr lang="ru-RU" sz="1100">
+                        <a:rPr lang="ru-RU" sz="1100" dirty="0">
                           <a:effectLst/>
+                          <a:latin typeface="Arial" panose="020B0604020202020204" pitchFamily="34" charset="0"/>
+                          <a:ea typeface="Calibri" panose="020F0502020204030204" pitchFamily="34" charset="0"/>
+                          <a:cs typeface="Times New Roman" panose="02020603050405020304" pitchFamily="18" charset="0"/>
                         </a:rPr>
-                        <a:t>CRC-16/DECT-X</a:t>
+                        <a:t>DECT-R</a:t>
                       </a:r>
-                      <a:endParaRPr lang="ru-RU" sz="1100">
+                      <a:endParaRPr lang="ru-RU" sz="1100" dirty="0">
                         <a:effectLst/>
                         <a:latin typeface="Calibri" panose="020F0502020204030204" pitchFamily="34" charset="0"/>
                         <a:ea typeface="Calibri" panose="020F0502020204030204" pitchFamily="34" charset="0"/>
@@ -7519,6 +7705,9 @@
                       <a:r>
                         <a:rPr lang="ru-RU" sz="1100">
                           <a:effectLst/>
+                          <a:latin typeface="Arial" panose="020B0604020202020204" pitchFamily="34" charset="0"/>
+                          <a:ea typeface="Calibri" panose="020F0502020204030204" pitchFamily="34" charset="0"/>
+                          <a:cs typeface="Times New Roman" panose="02020603050405020304" pitchFamily="18" charset="0"/>
                         </a:rPr>
                         <a:t>0x0589</a:t>
                       </a:r>
@@ -7548,6 +7737,9 @@
                       <a:r>
                         <a:rPr lang="ru-RU" sz="1100">
                           <a:effectLst/>
+                          <a:latin typeface="Arial" panose="020B0604020202020204" pitchFamily="34" charset="0"/>
+                          <a:ea typeface="Calibri" panose="020F0502020204030204" pitchFamily="34" charset="0"/>
+                          <a:cs typeface="Times New Roman" panose="02020603050405020304" pitchFamily="18" charset="0"/>
                         </a:rPr>
                         <a:t>0x0000</a:t>
                       </a:r>
@@ -7575,8 +7767,19 @@
                         </a:spcAft>
                       </a:pPr>
                       <a:r>
-                        <a:rPr lang="ru-RU" sz="1100">
+                        <a:rPr kumimoji="0" lang="en-US" sz="1100" b="0" i="0" u="none" strike="noStrike" kern="1200" cap="none" spc="0" normalizeH="0" baseline="0" noProof="0">
+                          <a:ln>
+                            <a:noFill/>
+                          </a:ln>
+                          <a:solidFill>
+                            <a:srgbClr val="292934"/>
+                          </a:solidFill>
                           <a:effectLst/>
+                          <a:uLnTx/>
+                          <a:uFillTx/>
+                          <a:latin typeface="Arial" panose="020B0604020202020204" pitchFamily="34" charset="0"/>
+                          <a:ea typeface="Calibri" panose="020F0502020204030204" pitchFamily="34" charset="0"/>
+                          <a:cs typeface="Times New Roman" panose="02020603050405020304" pitchFamily="18" charset="0"/>
                         </a:rPr>
                         <a:t>FALSE</a:t>
                       </a:r>
@@ -7604,12 +7807,23 @@
                         </a:spcAft>
                       </a:pPr>
                       <a:r>
-                        <a:rPr lang="ru-RU" sz="1100">
+                        <a:rPr kumimoji="0" lang="en-US" sz="1100" b="0" i="0" u="none" strike="noStrike" kern="1200" cap="none" spc="0" normalizeH="0" baseline="0" noProof="0">
+                          <a:ln>
+                            <a:noFill/>
+                          </a:ln>
+                          <a:solidFill>
+                            <a:srgbClr val="292934"/>
+                          </a:solidFill>
                           <a:effectLst/>
+                          <a:uLnTx/>
+                          <a:uFillTx/>
+                          <a:latin typeface="Arial" panose="020B0604020202020204" pitchFamily="34" charset="0"/>
+                          <a:ea typeface="Calibri" panose="020F0502020204030204" pitchFamily="34" charset="0"/>
+                          <a:cs typeface="Times New Roman" panose="02020603050405020304" pitchFamily="18" charset="0"/>
                         </a:rPr>
                         <a:t>FALSE</a:t>
                       </a:r>
-                      <a:endParaRPr lang="ru-RU" sz="1100">
+                      <a:endParaRPr lang="ru-RU" sz="1100" dirty="0">
                         <a:effectLst/>
                         <a:latin typeface="Calibri" panose="020F0502020204030204" pitchFamily="34" charset="0"/>
                         <a:ea typeface="Calibri" panose="020F0502020204030204" pitchFamily="34" charset="0"/>
@@ -7635,6 +7849,9 @@
                       <a:r>
                         <a:rPr lang="ru-RU" sz="1100">
                           <a:effectLst/>
+                          <a:latin typeface="Arial" panose="020B0604020202020204" pitchFamily="34" charset="0"/>
+                          <a:ea typeface="Calibri" panose="020F0502020204030204" pitchFamily="34" charset="0"/>
+                          <a:cs typeface="Times New Roman" panose="02020603050405020304" pitchFamily="18" charset="0"/>
                         </a:rPr>
                         <a:t>0x0001</a:t>
                       </a:r>
@@ -7650,7 +7867,7 @@
                 </a:tc>
                 <a:extLst>
                   <a:ext uri="{0D108BD9-81ED-4DB2-BD59-A6C34878D82A}">
-                    <a16:rowId xmlns="" xmlns:a16="http://schemas.microsoft.com/office/drawing/2014/main" val="1448887913"/>
+                    <a16:rowId xmlns:a16="http://schemas.microsoft.com/office/drawing/2014/main" val="1448887913"/>
                   </a:ext>
                 </a:extLst>
               </a:tr>
@@ -7698,12 +7915,15 @@
                         </a:spcAft>
                       </a:pPr>
                       <a:r>
-                        <a:rPr lang="ru-RU" sz="1100">
+                        <a:rPr lang="ru-RU" sz="1100" dirty="0">
                           <a:effectLst/>
+                          <a:latin typeface="Arial" panose="020B0604020202020204" pitchFamily="34" charset="0"/>
+                          <a:ea typeface="Calibri" panose="020F0502020204030204" pitchFamily="34" charset="0"/>
+                          <a:cs typeface="Times New Roman" panose="02020603050405020304" pitchFamily="18" charset="0"/>
                         </a:rPr>
-                        <a:t>CRC-16/DNP</a:t>
+                        <a:t>DECT-X</a:t>
                       </a:r>
-                      <a:endParaRPr lang="ru-RU" sz="1100">
+                      <a:endParaRPr lang="ru-RU" sz="1100" dirty="0">
                         <a:effectLst/>
                         <a:latin typeface="Calibri" panose="020F0502020204030204" pitchFamily="34" charset="0"/>
                         <a:ea typeface="Calibri" panose="020F0502020204030204" pitchFamily="34" charset="0"/>
@@ -7729,6 +7949,9 @@
                       <a:r>
                         <a:rPr lang="ru-RU" sz="1100">
                           <a:effectLst/>
+                          <a:latin typeface="Arial" panose="020B0604020202020204" pitchFamily="34" charset="0"/>
+                          <a:ea typeface="Calibri" panose="020F0502020204030204" pitchFamily="34" charset="0"/>
+                          <a:cs typeface="Times New Roman" panose="02020603050405020304" pitchFamily="18" charset="0"/>
                         </a:rPr>
                         <a:t>0x0589</a:t>
                       </a:r>
@@ -7758,6 +7981,9 @@
                       <a:r>
                         <a:rPr lang="ru-RU" sz="1100">
                           <a:effectLst/>
+                          <a:latin typeface="Arial" panose="020B0604020202020204" pitchFamily="34" charset="0"/>
+                          <a:ea typeface="Calibri" panose="020F0502020204030204" pitchFamily="34" charset="0"/>
+                          <a:cs typeface="Times New Roman" panose="02020603050405020304" pitchFamily="18" charset="0"/>
                         </a:rPr>
                         <a:t>0x0000</a:t>
                       </a:r>
@@ -7785,12 +8011,63 @@
                         </a:spcAft>
                       </a:pPr>
                       <a:r>
-                        <a:rPr lang="ru-RU" sz="1100">
+                        <a:rPr kumimoji="0" lang="en-US" sz="1100" b="0" i="0" u="none" strike="noStrike" kern="1200" cap="none" spc="0" normalizeH="0" baseline="0" noProof="0">
+                          <a:ln>
+                            <a:noFill/>
+                          </a:ln>
+                          <a:solidFill>
+                            <a:srgbClr val="292934"/>
+                          </a:solidFill>
                           <a:effectLst/>
+                          <a:uLnTx/>
+                          <a:uFillTx/>
+                          <a:latin typeface="Arial" panose="020B0604020202020204" pitchFamily="34" charset="0"/>
+                          <a:ea typeface="Calibri" panose="020F0502020204030204" pitchFamily="34" charset="0"/>
+                          <a:cs typeface="Times New Roman" panose="02020603050405020304" pitchFamily="18" charset="0"/>
                         </a:rPr>
                         <a:t>FALSE</a:t>
                       </a:r>
-                      <a:endParaRPr lang="ru-RU" sz="1100">
+                      <a:endParaRPr lang="ru-RU" sz="1100" dirty="0">
+                        <a:effectLst/>
+                        <a:latin typeface="Calibri" panose="020F0502020204030204" pitchFamily="34" charset="0"/>
+                        <a:ea typeface="Calibri" panose="020F0502020204030204" pitchFamily="34" charset="0"/>
+                        <a:cs typeface="Times New Roman" panose="02020603050405020304" pitchFamily="18" charset="0"/>
+                      </a:endParaRPr>
+                    </a:p>
+                  </a:txBody>
+                  <a:tcPr marL="68580" marR="68580" marT="0" marB="0" anchor="ctr"/>
+                </a:tc>
+                <a:tc>
+                  <a:txBody>
+                    <a:bodyPr/>
+                    <a:lstStyle/>
+                    <a:p>
+                      <a:pPr algn="ctr">
+                        <a:lnSpc>
+                          <a:spcPct val="107000"/>
+                        </a:lnSpc>
+                        <a:spcAft>
+                          <a:spcPts val="0"/>
+                        </a:spcAft>
+                      </a:pPr>
+                      <a:r>
+                        <a:rPr kumimoji="0" lang="en-US" sz="1100" b="0" i="0" u="none" strike="noStrike" kern="1200" cap="none" spc="0" normalizeH="0" baseline="0" noProof="0" dirty="0">
+                          <a:ln>
+                            <a:noFill/>
+                          </a:ln>
+                          <a:solidFill>
+                            <a:srgbClr val="292934"/>
+                          </a:solidFill>
+                          <a:effectLst/>
+                          <a:uLnTx/>
+                          <a:uFillTx/>
+                          <a:latin typeface="Arial" panose="020B0604020202020204" pitchFamily="34" charset="0"/>
+                          <a:ea typeface="Calibri" panose="020F0502020204030204" pitchFamily="34" charset="0"/>
+                          <a:cs typeface="Times New Roman" panose="02020603050405020304" pitchFamily="18" charset="0"/>
+                        </a:rPr>
+                        <a:t>FALSE</a:t>
+                      </a:r>
+                      <a:endParaRPr lang="ru-RU" sz="1100" dirty="0">
                         <a:effectLst/>
                         <a:latin typeface="Calibri" panose="020F0502020204030204" pitchFamily="34" charset="0"/>
                         <a:ea typeface="Calibri" panose="020F0502020204030204" pitchFamily="34" charset="0"/>
@@ -7816,35 +8093,9 @@
                       <a:r>
                         <a:rPr lang="ru-RU" sz="1100">
                           <a:effectLst/>
-                        </a:rPr>
-                        <a:t>FALSE</a:t>
-                      </a:r>
-                      <a:endParaRPr lang="ru-RU" sz="1100">
-                        <a:effectLst/>
-                        <a:latin typeface="Calibri" panose="020F0502020204030204" pitchFamily="34" charset="0"/>
-                        <a:ea typeface="Calibri" panose="020F0502020204030204" pitchFamily="34" charset="0"/>
-                        <a:cs typeface="Times New Roman" panose="02020603050405020304" pitchFamily="18" charset="0"/>
-                      </a:endParaRPr>
-                    </a:p>
-                  </a:txBody>
-                  <a:tcPr marL="68580" marR="68580" marT="0" marB="0" anchor="ctr"/>
-                </a:tc>
-                <a:tc>
-                  <a:txBody>
-                    <a:bodyPr/>
-                    <a:lstStyle/>
-                    <a:p>
-                      <a:pPr algn="ctr">
-                        <a:lnSpc>
-                          <a:spcPct val="107000"/>
-                        </a:lnSpc>
-                        <a:spcAft>
-                          <a:spcPts val="0"/>
-                        </a:spcAft>
-                      </a:pPr>
-                      <a:r>
-                        <a:rPr lang="ru-RU" sz="1100">
-                          <a:effectLst/>
+                          <a:latin typeface="Arial" panose="020B0604020202020204" pitchFamily="34" charset="0"/>
+                          <a:ea typeface="Calibri" panose="020F0502020204030204" pitchFamily="34" charset="0"/>
+                          <a:cs typeface="Times New Roman" panose="02020603050405020304" pitchFamily="18" charset="0"/>
                         </a:rPr>
                         <a:t>0x0000</a:t>
                       </a:r>
@@ -7860,7 +8111,7 @@
                 </a:tc>
                 <a:extLst>
                   <a:ext uri="{0D108BD9-81ED-4DB2-BD59-A6C34878D82A}">
-                    <a16:rowId xmlns="" xmlns:a16="http://schemas.microsoft.com/office/drawing/2014/main" val="90268800"/>
+                    <a16:rowId xmlns:a16="http://schemas.microsoft.com/office/drawing/2014/main" val="90268800"/>
                   </a:ext>
                 </a:extLst>
               </a:tr>
@@ -7908,12 +8159,15 @@
                         </a:spcAft>
                       </a:pPr>
                       <a:r>
-                        <a:rPr lang="ru-RU" sz="1100">
+                        <a:rPr lang="ru-RU" sz="1100" dirty="0">
                           <a:effectLst/>
+                          <a:latin typeface="Arial" panose="020B0604020202020204" pitchFamily="34" charset="0"/>
+                          <a:ea typeface="Calibri" panose="020F0502020204030204" pitchFamily="34" charset="0"/>
+                          <a:cs typeface="Times New Roman" panose="02020603050405020304" pitchFamily="18" charset="0"/>
                         </a:rPr>
-                        <a:t>CRC-16/EN-13757</a:t>
+                        <a:t>DNP</a:t>
                       </a:r>
-                      <a:endParaRPr lang="ru-RU" sz="1100">
+                      <a:endParaRPr lang="ru-RU" sz="1100" dirty="0">
                         <a:effectLst/>
                         <a:latin typeface="Calibri" panose="020F0502020204030204" pitchFamily="34" charset="0"/>
                         <a:ea typeface="Calibri" panose="020F0502020204030204" pitchFamily="34" charset="0"/>
@@ -7939,6 +8193,9 @@
                       <a:r>
                         <a:rPr lang="ru-RU" sz="1100">
                           <a:effectLst/>
+                          <a:latin typeface="Arial" panose="020B0604020202020204" pitchFamily="34" charset="0"/>
+                          <a:ea typeface="Calibri" panose="020F0502020204030204" pitchFamily="34" charset="0"/>
+                          <a:cs typeface="Times New Roman" panose="02020603050405020304" pitchFamily="18" charset="0"/>
                         </a:rPr>
                         <a:t>0x3D65</a:t>
                       </a:r>
@@ -7968,6 +8225,9 @@
                       <a:r>
                         <a:rPr lang="ru-RU" sz="1100">
                           <a:effectLst/>
+                          <a:latin typeface="Arial" panose="020B0604020202020204" pitchFamily="34" charset="0"/>
+                          <a:ea typeface="Calibri" panose="020F0502020204030204" pitchFamily="34" charset="0"/>
+                          <a:cs typeface="Times New Roman" panose="02020603050405020304" pitchFamily="18" charset="0"/>
                         </a:rPr>
                         <a:t>0x0000</a:t>
                       </a:r>
@@ -7995,12 +8255,47 @@
                         </a:spcAft>
                       </a:pPr>
                       <a:r>
-                        <a:rPr lang="ru-RU" sz="1100">
+                        <a:rPr lang="en-US" sz="1100" dirty="0">
                           <a:effectLst/>
+                          <a:latin typeface="Arial" panose="020B0604020202020204" pitchFamily="34" charset="0"/>
+                          <a:ea typeface="Calibri" panose="020F0502020204030204" pitchFamily="34" charset="0"/>
+                          <a:cs typeface="Times New Roman" panose="02020603050405020304" pitchFamily="18" charset="0"/>
                         </a:rPr>
                         <a:t>TRUE</a:t>
                       </a:r>
-                      <a:endParaRPr lang="ru-RU" sz="1100">
+                      <a:endParaRPr lang="ru-RU" sz="1100" dirty="0">
+                        <a:effectLst/>
+                        <a:latin typeface="Calibri" panose="020F0502020204030204" pitchFamily="34" charset="0"/>
+                        <a:ea typeface="Calibri" panose="020F0502020204030204" pitchFamily="34" charset="0"/>
+                        <a:cs typeface="Times New Roman" panose="02020603050405020304" pitchFamily="18" charset="0"/>
+                      </a:endParaRPr>
+                    </a:p>
+                  </a:txBody>
+                  <a:tcPr marL="68580" marR="68580" marT="0" marB="0" anchor="ctr"/>
+                </a:tc>
+                <a:tc>
+                  <a:txBody>
+                    <a:bodyPr/>
+                    <a:lstStyle/>
+                    <a:p>
+                      <a:pPr algn="ctr">
+                        <a:lnSpc>
+                          <a:spcPct val="107000"/>
+                        </a:lnSpc>
+                        <a:spcAft>
+                          <a:spcPts val="0"/>
+                        </a:spcAft>
+                      </a:pPr>
+                      <a:r>
+                        <a:rPr lang="en-US" sz="1100" dirty="0">
+                          <a:effectLst/>
+                          <a:latin typeface="Arial" panose="020B0604020202020204" pitchFamily="34" charset="0"/>
+                          <a:ea typeface="Calibri" panose="020F0502020204030204" pitchFamily="34" charset="0"/>
+                          <a:cs typeface="Times New Roman" panose="02020603050405020304" pitchFamily="18" charset="0"/>
+                        </a:rPr>
+                        <a:t>TRUE</a:t>
+                      </a:r>
+                      <a:endParaRPr lang="ru-RU" sz="1100" dirty="0">
                         <a:effectLst/>
                         <a:latin typeface="Calibri" panose="020F0502020204030204" pitchFamily="34" charset="0"/>
                         <a:ea typeface="Calibri" panose="020F0502020204030204" pitchFamily="34" charset="0"/>
@@ -8026,35 +8321,9 @@
                       <a:r>
                         <a:rPr lang="ru-RU" sz="1100">
                           <a:effectLst/>
-                        </a:rPr>
-                        <a:t>TRUE</a:t>
-                      </a:r>
-                      <a:endParaRPr lang="ru-RU" sz="1100">
-                        <a:effectLst/>
-                        <a:latin typeface="Calibri" panose="020F0502020204030204" pitchFamily="34" charset="0"/>
-                        <a:ea typeface="Calibri" panose="020F0502020204030204" pitchFamily="34" charset="0"/>
-                        <a:cs typeface="Times New Roman" panose="02020603050405020304" pitchFamily="18" charset="0"/>
-                      </a:endParaRPr>
-                    </a:p>
-                  </a:txBody>
-                  <a:tcPr marL="68580" marR="68580" marT="0" marB="0" anchor="ctr"/>
-                </a:tc>
-                <a:tc>
-                  <a:txBody>
-                    <a:bodyPr/>
-                    <a:lstStyle/>
-                    <a:p>
-                      <a:pPr algn="ctr">
-                        <a:lnSpc>
-                          <a:spcPct val="107000"/>
-                        </a:lnSpc>
-                        <a:spcAft>
-                          <a:spcPts val="0"/>
-                        </a:spcAft>
-                      </a:pPr>
-                      <a:r>
-                        <a:rPr lang="ru-RU" sz="1100">
-                          <a:effectLst/>
+                          <a:latin typeface="Arial" panose="020B0604020202020204" pitchFamily="34" charset="0"/>
+                          <a:ea typeface="Calibri" panose="020F0502020204030204" pitchFamily="34" charset="0"/>
+                          <a:cs typeface="Times New Roman" panose="02020603050405020304" pitchFamily="18" charset="0"/>
                         </a:rPr>
                         <a:t>0xFFFF</a:t>
                       </a:r>
@@ -8070,7 +8339,7 @@
                 </a:tc>
                 <a:extLst>
                   <a:ext uri="{0D108BD9-81ED-4DB2-BD59-A6C34878D82A}">
-                    <a16:rowId xmlns="" xmlns:a16="http://schemas.microsoft.com/office/drawing/2014/main" val="3156748967"/>
+                    <a16:rowId xmlns:a16="http://schemas.microsoft.com/office/drawing/2014/main" val="3156748967"/>
                   </a:ext>
                 </a:extLst>
               </a:tr>
@@ -8120,8 +8389,11 @@
                       <a:r>
                         <a:rPr lang="ru-RU" sz="1100" dirty="0">
                           <a:effectLst/>
+                          <a:latin typeface="Arial" panose="020B0604020202020204" pitchFamily="34" charset="0"/>
+                          <a:ea typeface="Calibri" panose="020F0502020204030204" pitchFamily="34" charset="0"/>
+                          <a:cs typeface="Times New Roman" panose="02020603050405020304" pitchFamily="18" charset="0"/>
                         </a:rPr>
-                        <a:t>CRC-16/GENIBUS</a:t>
+                        <a:t>EN-13757</a:t>
                       </a:r>
                       <a:endParaRPr lang="ru-RU" sz="1100" dirty="0">
                         <a:effectLst/>
@@ -8149,6 +8421,9 @@
                       <a:r>
                         <a:rPr lang="ru-RU" sz="1100">
                           <a:effectLst/>
+                          <a:latin typeface="Arial" panose="020B0604020202020204" pitchFamily="34" charset="0"/>
+                          <a:ea typeface="Calibri" panose="020F0502020204030204" pitchFamily="34" charset="0"/>
+                          <a:cs typeface="Times New Roman" panose="02020603050405020304" pitchFamily="18" charset="0"/>
                         </a:rPr>
                         <a:t>0x3D65</a:t>
                       </a:r>
@@ -8178,6 +8453,9 @@
                       <a:r>
                         <a:rPr lang="ru-RU" sz="1100">
                           <a:effectLst/>
+                          <a:latin typeface="Arial" panose="020B0604020202020204" pitchFamily="34" charset="0"/>
+                          <a:ea typeface="Calibri" panose="020F0502020204030204" pitchFamily="34" charset="0"/>
+                          <a:cs typeface="Times New Roman" panose="02020603050405020304" pitchFamily="18" charset="0"/>
                         </a:rPr>
                         <a:t>0x0000</a:t>
                       </a:r>
@@ -8205,12 +8483,23 @@
                         </a:spcAft>
                       </a:pPr>
                       <a:r>
-                        <a:rPr lang="ru-RU" sz="1100">
+                        <a:rPr kumimoji="0" lang="en-US" sz="1100" b="0" i="0" u="none" strike="noStrike" kern="1200" cap="none" spc="0" normalizeH="0" baseline="0" noProof="0">
+                          <a:ln>
+                            <a:noFill/>
+                          </a:ln>
+                          <a:solidFill>
+                            <a:srgbClr val="292934"/>
+                          </a:solidFill>
                           <a:effectLst/>
+                          <a:uLnTx/>
+                          <a:uFillTx/>
+                          <a:latin typeface="Arial" panose="020B0604020202020204" pitchFamily="34" charset="0"/>
+                          <a:ea typeface="Calibri" panose="020F0502020204030204" pitchFamily="34" charset="0"/>
+                          <a:cs typeface="Times New Roman" panose="02020603050405020304" pitchFamily="18" charset="0"/>
                         </a:rPr>
                         <a:t>FALSE</a:t>
                       </a:r>
-                      <a:endParaRPr lang="ru-RU" sz="1100">
+                      <a:endParaRPr lang="ru-RU" sz="1100" dirty="0">
                         <a:effectLst/>
                         <a:latin typeface="Calibri" panose="020F0502020204030204" pitchFamily="34" charset="0"/>
                         <a:ea typeface="Calibri" panose="020F0502020204030204" pitchFamily="34" charset="0"/>
@@ -8234,12 +8523,23 @@
                         </a:spcAft>
                       </a:pPr>
                       <a:r>
-                        <a:rPr lang="ru-RU" sz="1100">
+                        <a:rPr kumimoji="0" lang="en-US" sz="1100" b="0" i="0" u="none" strike="noStrike" kern="1200" cap="none" spc="0" normalizeH="0" baseline="0" noProof="0" dirty="0">
+                          <a:ln>
+                            <a:noFill/>
+                          </a:ln>
+                          <a:solidFill>
+                            <a:srgbClr val="292934"/>
+                          </a:solidFill>
                           <a:effectLst/>
+                          <a:uLnTx/>
+                          <a:uFillTx/>
+                          <a:latin typeface="Arial" panose="020B0604020202020204" pitchFamily="34" charset="0"/>
+                          <a:ea typeface="Calibri" panose="020F0502020204030204" pitchFamily="34" charset="0"/>
+                          <a:cs typeface="Times New Roman" panose="02020603050405020304" pitchFamily="18" charset="0"/>
                         </a:rPr>
                         <a:t>FALSE</a:t>
                       </a:r>
-                      <a:endParaRPr lang="ru-RU" sz="1100">
+                      <a:endParaRPr lang="ru-RU" sz="1100" dirty="0">
                         <a:effectLst/>
                         <a:latin typeface="Calibri" panose="020F0502020204030204" pitchFamily="34" charset="0"/>
                         <a:ea typeface="Calibri" panose="020F0502020204030204" pitchFamily="34" charset="0"/>
@@ -8265,6 +8565,9 @@
                       <a:r>
                         <a:rPr lang="ru-RU" sz="1100" dirty="0">
                           <a:effectLst/>
+                          <a:latin typeface="Arial" panose="020B0604020202020204" pitchFamily="34" charset="0"/>
+                          <a:ea typeface="Calibri" panose="020F0502020204030204" pitchFamily="34" charset="0"/>
+                          <a:cs typeface="Times New Roman" panose="02020603050405020304" pitchFamily="18" charset="0"/>
                         </a:rPr>
                         <a:t>0xFFFF</a:t>
                       </a:r>
@@ -8280,7 +8583,7 @@
                 </a:tc>
                 <a:extLst>
                   <a:ext uri="{0D108BD9-81ED-4DB2-BD59-A6C34878D82A}">
-                    <a16:rowId xmlns="" xmlns:a16="http://schemas.microsoft.com/office/drawing/2014/main" val="621821705"/>
+                    <a16:rowId xmlns:a16="http://schemas.microsoft.com/office/drawing/2014/main" val="621821705"/>
                   </a:ext>
                 </a:extLst>
               </a:tr>
@@ -8549,7 +8852,7 @@
           <p:cNvPr id="7" name="Рисунок 6">
             <a:extLst>
               <a:ext uri="{FF2B5EF4-FFF2-40B4-BE49-F238E27FC236}">
-                <a16:creationId xmlns="" xmlns:a16="http://schemas.microsoft.com/office/drawing/2014/main" id="{0CA2A49E-70BF-4E17-87DC-F51722D565A4}"/>
+                <a16:creationId xmlns:a16="http://schemas.microsoft.com/office/drawing/2014/main" id="{0CA2A49E-70BF-4E17-87DC-F51722D565A4}"/>
               </a:ext>
             </a:extLst>
           </p:cNvPr>
@@ -8579,7 +8882,7 @@
           <p:cNvPr id="8" name="Рисунок 7">
             <a:extLst>
               <a:ext uri="{FF2B5EF4-FFF2-40B4-BE49-F238E27FC236}">
-                <a16:creationId xmlns="" xmlns:a16="http://schemas.microsoft.com/office/drawing/2014/main" id="{3B0225AA-5022-4AAA-8971-29B335439242}"/>
+                <a16:creationId xmlns:a16="http://schemas.microsoft.com/office/drawing/2014/main" id="{3B0225AA-5022-4AAA-8971-29B335439242}"/>
               </a:ext>
             </a:extLst>
           </p:cNvPr>
@@ -8607,7 +8910,7 @@
           <p:cNvPr id="9" name="Рисунок 8">
             <a:extLst>
               <a:ext uri="{FF2B5EF4-FFF2-40B4-BE49-F238E27FC236}">
-                <a16:creationId xmlns="" xmlns:a16="http://schemas.microsoft.com/office/drawing/2014/main" id="{0150F435-9C5F-4F6E-A656-A0019D4E1048}"/>
+                <a16:creationId xmlns:a16="http://schemas.microsoft.com/office/drawing/2014/main" id="{0150F435-9C5F-4F6E-A656-A0019D4E1048}"/>
               </a:ext>
             </a:extLst>
           </p:cNvPr>
@@ -8637,7 +8940,7 @@
           <p:cNvPr id="10" name="Стрелка: вниз 9">
             <a:extLst>
               <a:ext uri="{FF2B5EF4-FFF2-40B4-BE49-F238E27FC236}">
-                <a16:creationId xmlns="" xmlns:a16="http://schemas.microsoft.com/office/drawing/2014/main" id="{28C54050-DF9E-4EA3-8B6B-5862F781F699}"/>
+                <a16:creationId xmlns:a16="http://schemas.microsoft.com/office/drawing/2014/main" id="{28C54050-DF9E-4EA3-8B6B-5862F781F699}"/>
               </a:ext>
             </a:extLst>
           </p:cNvPr>
@@ -8683,7 +8986,7 @@
           <p:cNvPr id="11" name="TextBox 10">
             <a:extLst>
               <a:ext uri="{FF2B5EF4-FFF2-40B4-BE49-F238E27FC236}">
-                <a16:creationId xmlns="" xmlns:a16="http://schemas.microsoft.com/office/drawing/2014/main" id="{DE41E25D-9B4C-41CE-972D-DE8A05417FC6}"/>
+                <a16:creationId xmlns:a16="http://schemas.microsoft.com/office/drawing/2014/main" id="{DE41E25D-9B4C-41CE-972D-DE8A05417FC6}"/>
               </a:ext>
             </a:extLst>
           </p:cNvPr>
@@ -8735,7 +9038,7 @@
           <p:cNvPr id="12" name="Заголовок 1">
             <a:extLst>
               <a:ext uri="{FF2B5EF4-FFF2-40B4-BE49-F238E27FC236}">
-                <a16:creationId xmlns="" xmlns:a16="http://schemas.microsoft.com/office/drawing/2014/main" id="{31DCF4EB-624F-4817-AC32-682B0ABBD71A}"/>
+                <a16:creationId xmlns:a16="http://schemas.microsoft.com/office/drawing/2014/main" id="{31DCF4EB-624F-4817-AC32-682B0ABBD71A}"/>
               </a:ext>
             </a:extLst>
           </p:cNvPr>
@@ -8791,7 +9094,7 @@
           <p:cNvPr id="13" name="Заголовок 1">
             <a:extLst>
               <a:ext uri="{FF2B5EF4-FFF2-40B4-BE49-F238E27FC236}">
-                <a16:creationId xmlns="" xmlns:a16="http://schemas.microsoft.com/office/drawing/2014/main" id="{FCC8D4B3-14CC-4D4A-99A1-B35B24CA1A48}"/>
+                <a16:creationId xmlns:a16="http://schemas.microsoft.com/office/drawing/2014/main" id="{FCC8D4B3-14CC-4D4A-99A1-B35B24CA1A48}"/>
               </a:ext>
             </a:extLst>
           </p:cNvPr>
@@ -8842,7 +9145,7 @@
           <p:cNvPr id="14" name="Заголовок 1">
             <a:extLst>
               <a:ext uri="{FF2B5EF4-FFF2-40B4-BE49-F238E27FC236}">
-                <a16:creationId xmlns="" xmlns:a16="http://schemas.microsoft.com/office/drawing/2014/main" id="{99980ECD-B229-4FBF-AAC2-3238EC9E49F0}"/>
+                <a16:creationId xmlns:a16="http://schemas.microsoft.com/office/drawing/2014/main" id="{99980ECD-B229-4FBF-AAC2-3238EC9E49F0}"/>
               </a:ext>
             </a:extLst>
           </p:cNvPr>
@@ -8950,7 +9253,7 @@
           <p:cNvPr id="3" name="Рисунок 2">
             <a:extLst>
               <a:ext uri="{FF2B5EF4-FFF2-40B4-BE49-F238E27FC236}">
-                <a16:creationId xmlns="" xmlns:a16="http://schemas.microsoft.com/office/drawing/2014/main" id="{904898CB-3878-4D84-AC10-C042A8E84460}"/>
+                <a16:creationId xmlns:a16="http://schemas.microsoft.com/office/drawing/2014/main" id="{904898CB-3878-4D84-AC10-C042A8E84460}"/>
               </a:ext>
             </a:extLst>
           </p:cNvPr>
@@ -8977,49 +9280,12 @@
           </a:ln>
         </p:spPr>
       </p:pic>
-      <p:pic>
-        <p:nvPicPr>
-          <p:cNvPr id="4" name="Рисунок 3">
-            <a:extLst>
-              <a:ext uri="{FF2B5EF4-FFF2-40B4-BE49-F238E27FC236}">
-                <a16:creationId xmlns="" xmlns:a16="http://schemas.microsoft.com/office/drawing/2014/main" id="{8BBF0E0E-DF96-45EC-9B2A-6B015734076C}"/>
-              </a:ext>
-            </a:extLst>
-          </p:cNvPr>
-          <p:cNvPicPr/>
-          <p:nvPr/>
-        </p:nvPicPr>
-        <p:blipFill rotWithShape="1">
-          <a:blip r:embed="rId3"/>
-          <a:srcRect t="1196" b="2369"/>
-          <a:stretch/>
-        </p:blipFill>
-        <p:spPr bwMode="auto">
-          <a:xfrm>
-            <a:off x="3923928" y="2708920"/>
-            <a:ext cx="5001895" cy="3448685"/>
-          </a:xfrm>
-          <a:prstGeom prst="rect">
-            <a:avLst/>
-          </a:prstGeom>
-          <a:ln>
-            <a:solidFill>
-              <a:schemeClr val="tx1"/>
-            </a:solidFill>
-          </a:ln>
-          <a:extLst>
-            <a:ext uri="{53640926-AAD7-44D8-BBD7-CCE9431645EC}">
-              <a14:shadowObscured xmlns:a14="http://schemas.microsoft.com/office/drawing/2010/main"/>
-            </a:ext>
-          </a:extLst>
-        </p:spPr>
-      </p:pic>
       <p:sp>
         <p:nvSpPr>
           <p:cNvPr id="6" name="Заголовок 1">
             <a:extLst>
               <a:ext uri="{FF2B5EF4-FFF2-40B4-BE49-F238E27FC236}">
-                <a16:creationId xmlns="" xmlns:a16="http://schemas.microsoft.com/office/drawing/2014/main" id="{F8613225-80AE-4242-A5AE-25E4C0C8B202}"/>
+                <a16:creationId xmlns:a16="http://schemas.microsoft.com/office/drawing/2014/main" id="{F8613225-80AE-4242-A5AE-25E4C0C8B202}"/>
               </a:ext>
             </a:extLst>
           </p:cNvPr>
@@ -9070,7 +9336,7 @@
           <p:cNvPr id="7" name="Заголовок 1">
             <a:extLst>
               <a:ext uri="{FF2B5EF4-FFF2-40B4-BE49-F238E27FC236}">
-                <a16:creationId xmlns="" xmlns:a16="http://schemas.microsoft.com/office/drawing/2014/main" id="{634640D4-1F09-4EBB-8392-7BF308EAFC79}"/>
+                <a16:creationId xmlns:a16="http://schemas.microsoft.com/office/drawing/2014/main" id="{634640D4-1F09-4EBB-8392-7BF308EAFC79}"/>
               </a:ext>
             </a:extLst>
           </p:cNvPr>
@@ -9121,7 +9387,7 @@
           <p:cNvPr id="8" name="Заголовок 1">
             <a:extLst>
               <a:ext uri="{FF2B5EF4-FFF2-40B4-BE49-F238E27FC236}">
-                <a16:creationId xmlns="" xmlns:a16="http://schemas.microsoft.com/office/drawing/2014/main" id="{44BCF2E9-6E87-4C83-BB7E-63A63C075F75}"/>
+                <a16:creationId xmlns:a16="http://schemas.microsoft.com/office/drawing/2014/main" id="{44BCF2E9-6E87-4C83-BB7E-63A63C075F75}"/>
               </a:ext>
             </a:extLst>
           </p:cNvPr>
@@ -9173,7 +9439,7 @@
           <p:cNvPr id="10" name="Заголовок 1">
             <a:extLst>
               <a:ext uri="{FF2B5EF4-FFF2-40B4-BE49-F238E27FC236}">
-                <a16:creationId xmlns="" xmlns:a16="http://schemas.microsoft.com/office/drawing/2014/main" id="{ABDC8776-2B15-4387-A88C-C05FB178EC9A}"/>
+                <a16:creationId xmlns:a16="http://schemas.microsoft.com/office/drawing/2014/main" id="{ABDC8776-2B15-4387-A88C-C05FB178EC9A}"/>
               </a:ext>
             </a:extLst>
           </p:cNvPr>
@@ -9225,7 +9491,7 @@
           <p:cNvPr id="11" name="Заголовок 1">
             <a:extLst>
               <a:ext uri="{FF2B5EF4-FFF2-40B4-BE49-F238E27FC236}">
-                <a16:creationId xmlns="" xmlns:a16="http://schemas.microsoft.com/office/drawing/2014/main" id="{645E7B5D-07A9-4CBA-9A9B-89428B795EB4}"/>
+                <a16:creationId xmlns:a16="http://schemas.microsoft.com/office/drawing/2014/main" id="{645E7B5D-07A9-4CBA-9A9B-89428B795EB4}"/>
               </a:ext>
             </a:extLst>
           </p:cNvPr>
@@ -9277,7 +9543,7 @@
           <p:cNvPr id="12" name="Стрелка: вправо 11">
             <a:extLst>
               <a:ext uri="{FF2B5EF4-FFF2-40B4-BE49-F238E27FC236}">
-                <a16:creationId xmlns="" xmlns:a16="http://schemas.microsoft.com/office/drawing/2014/main" id="{F596CF50-DE4F-44FB-9C2B-C8D25600E958}"/>
+                <a16:creationId xmlns:a16="http://schemas.microsoft.com/office/drawing/2014/main" id="{F596CF50-DE4F-44FB-9C2B-C8D25600E958}"/>
               </a:ext>
             </a:extLst>
           </p:cNvPr>
@@ -9323,7 +9589,7 @@
           <p:cNvPr id="13" name="Стрелка: вправо 12">
             <a:extLst>
               <a:ext uri="{FF2B5EF4-FFF2-40B4-BE49-F238E27FC236}">
-                <a16:creationId xmlns="" xmlns:a16="http://schemas.microsoft.com/office/drawing/2014/main" id="{46009754-9E95-4A73-83F6-23A7B22F6D49}"/>
+                <a16:creationId xmlns:a16="http://schemas.microsoft.com/office/drawing/2014/main" id="{46009754-9E95-4A73-83F6-23A7B22F6D49}"/>
               </a:ext>
             </a:extLst>
           </p:cNvPr>
@@ -9369,7 +9635,7 @@
           <p:cNvPr id="14" name="Заголовок 1">
             <a:extLst>
               <a:ext uri="{FF2B5EF4-FFF2-40B4-BE49-F238E27FC236}">
-                <a16:creationId xmlns="" xmlns:a16="http://schemas.microsoft.com/office/drawing/2014/main" id="{F17B9437-4D4F-46D6-B7E9-6409067D7170}"/>
+                <a16:creationId xmlns:a16="http://schemas.microsoft.com/office/drawing/2014/main" id="{F17B9437-4D4F-46D6-B7E9-6409067D7170}"/>
               </a:ext>
             </a:extLst>
           </p:cNvPr>
@@ -9424,7 +9690,7 @@
           <p:cNvPr id="15" name="Заголовок 1">
             <a:extLst>
               <a:ext uri="{FF2B5EF4-FFF2-40B4-BE49-F238E27FC236}">
-                <a16:creationId xmlns="" xmlns:a16="http://schemas.microsoft.com/office/drawing/2014/main" id="{AD9858F6-F0DD-4F80-9C7E-6F99DFA94BA3}"/>
+                <a16:creationId xmlns:a16="http://schemas.microsoft.com/office/drawing/2014/main" id="{AD9858F6-F0DD-4F80-9C7E-6F99DFA94BA3}"/>
               </a:ext>
             </a:extLst>
           </p:cNvPr>
@@ -9479,7 +9745,7 @@
           <p:cNvPr id="17" name="TextBox 16">
             <a:extLst>
               <a:ext uri="{FF2B5EF4-FFF2-40B4-BE49-F238E27FC236}">
-                <a16:creationId xmlns="" xmlns:a16="http://schemas.microsoft.com/office/drawing/2014/main" id="{1EB5417B-47B9-49B0-89EE-8CA33180F08E}"/>
+                <a16:creationId xmlns:a16="http://schemas.microsoft.com/office/drawing/2014/main" id="{1EB5417B-47B9-49B0-89EE-8CA33180F08E}"/>
               </a:ext>
             </a:extLst>
           </p:cNvPr>
@@ -9517,6 +9783,41 @@
           </a:p>
         </p:txBody>
       </p:sp>
+      <p:pic>
+        <p:nvPicPr>
+          <p:cNvPr id="5" name="Рисунок 4">
+            <a:extLst>
+              <a:ext uri="{FF2B5EF4-FFF2-40B4-BE49-F238E27FC236}">
+                <a16:creationId xmlns:a16="http://schemas.microsoft.com/office/drawing/2014/main" id="{5B13C906-E312-4B97-BB86-D20DD8232DF3}"/>
+              </a:ext>
+            </a:extLst>
+          </p:cNvPr>
+          <p:cNvPicPr>
+            <a:picLocks noChangeAspect="1"/>
+          </p:cNvPicPr>
+          <p:nvPr/>
+        </p:nvPicPr>
+        <p:blipFill>
+          <a:blip r:embed="rId3"/>
+          <a:stretch>
+            <a:fillRect/>
+          </a:stretch>
+        </p:blipFill>
+        <p:spPr>
+          <a:xfrm>
+            <a:off x="3888656" y="2499093"/>
+            <a:ext cx="4845384" cy="3463849"/>
+          </a:xfrm>
+          <a:prstGeom prst="rect">
+            <a:avLst/>
+          </a:prstGeom>
+          <a:ln>
+            <a:solidFill>
+              <a:schemeClr val="tx1"/>
+            </a:solidFill>
+          </a:ln>
+        </p:spPr>
+      </p:pic>
     </p:spTree>
     <p:extLst>
       <p:ext uri="{BB962C8B-B14F-4D97-AF65-F5344CB8AC3E}">
@@ -9579,7 +9880,7 @@
           <p:cNvPr id="10" name="Рисунок 9">
             <a:extLst>
               <a:ext uri="{FF2B5EF4-FFF2-40B4-BE49-F238E27FC236}">
-                <a16:creationId xmlns="" xmlns:a16="http://schemas.microsoft.com/office/drawing/2014/main" id="{38AE27DD-E3F2-4DF4-A578-C6DB03AFFEB1}"/>
+                <a16:creationId xmlns:a16="http://schemas.microsoft.com/office/drawing/2014/main" id="{38AE27DD-E3F2-4DF4-A578-C6DB03AFFEB1}"/>
               </a:ext>
             </a:extLst>
           </p:cNvPr>
@@ -9612,7 +9913,7 @@
           <p:cNvPr id="11" name="Рисунок 10">
             <a:extLst>
               <a:ext uri="{FF2B5EF4-FFF2-40B4-BE49-F238E27FC236}">
-                <a16:creationId xmlns="" xmlns:a16="http://schemas.microsoft.com/office/drawing/2014/main" id="{8E504D18-99D0-4765-859A-9231A0F9C766}"/>
+                <a16:creationId xmlns:a16="http://schemas.microsoft.com/office/drawing/2014/main" id="{8E504D18-99D0-4765-859A-9231A0F9C766}"/>
               </a:ext>
             </a:extLst>
           </p:cNvPr>
@@ -9645,7 +9946,7 @@
           <p:cNvPr id="12" name="Заголовок 1">
             <a:extLst>
               <a:ext uri="{FF2B5EF4-FFF2-40B4-BE49-F238E27FC236}">
-                <a16:creationId xmlns="" xmlns:a16="http://schemas.microsoft.com/office/drawing/2014/main" id="{86168443-8876-4337-A0CD-7F9F6F3488C7}"/>
+                <a16:creationId xmlns:a16="http://schemas.microsoft.com/office/drawing/2014/main" id="{86168443-8876-4337-A0CD-7F9F6F3488C7}"/>
               </a:ext>
             </a:extLst>
           </p:cNvPr>
@@ -9696,7 +9997,7 @@
           <p:cNvPr id="13" name="Заголовок 1">
             <a:extLst>
               <a:ext uri="{FF2B5EF4-FFF2-40B4-BE49-F238E27FC236}">
-                <a16:creationId xmlns="" xmlns:a16="http://schemas.microsoft.com/office/drawing/2014/main" id="{570247D2-C3C0-46B7-A9DE-42B319D68797}"/>
+                <a16:creationId xmlns:a16="http://schemas.microsoft.com/office/drawing/2014/main" id="{570247D2-C3C0-46B7-A9DE-42B319D68797}"/>
               </a:ext>
             </a:extLst>
           </p:cNvPr>
@@ -9747,7 +10048,7 @@
           <p:cNvPr id="14" name="Прямоугольник 13">
             <a:extLst>
               <a:ext uri="{FF2B5EF4-FFF2-40B4-BE49-F238E27FC236}">
-                <a16:creationId xmlns="" xmlns:a16="http://schemas.microsoft.com/office/drawing/2014/main" id="{F50D002B-058E-4F98-9AF4-66F020DCA7CB}"/>
+                <a16:creationId xmlns:a16="http://schemas.microsoft.com/office/drawing/2014/main" id="{F50D002B-058E-4F98-9AF4-66F020DCA7CB}"/>
               </a:ext>
             </a:extLst>
           </p:cNvPr>
@@ -9941,10 +10242,10 @@
       </p:sp>
       <p:pic>
         <p:nvPicPr>
-          <p:cNvPr id="7" name="Рисунок 6">
+          <p:cNvPr id="8" name="Рисунок 7">
             <a:extLst>
               <a:ext uri="{FF2B5EF4-FFF2-40B4-BE49-F238E27FC236}">
-                <a16:creationId xmlns="" xmlns:a16="http://schemas.microsoft.com/office/drawing/2014/main" id="{24AC9572-947A-46A5-90D9-55BF7272CCA3}"/>
+                <a16:creationId xmlns:a16="http://schemas.microsoft.com/office/drawing/2014/main" id="{0A49A755-2DCC-4638-8B86-974DCAFE4F52}"/>
               </a:ext>
             </a:extLst>
           </p:cNvPr>
@@ -9953,38 +10254,6 @@
         </p:nvPicPr>
         <p:blipFill rotWithShape="1">
           <a:blip r:embed="rId2"/>
-          <a:srcRect r="10088"/>
-          <a:stretch/>
-        </p:blipFill>
-        <p:spPr>
-          <a:xfrm>
-            <a:off x="395536" y="3005460"/>
-            <a:ext cx="4104456" cy="2926715"/>
-          </a:xfrm>
-          <a:prstGeom prst="rect">
-            <a:avLst/>
-          </a:prstGeom>
-          <a:ln>
-            <a:solidFill>
-              <a:schemeClr val="tx1"/>
-            </a:solidFill>
-          </a:ln>
-        </p:spPr>
-      </p:pic>
-      <p:pic>
-        <p:nvPicPr>
-          <p:cNvPr id="8" name="Рисунок 7">
-            <a:extLst>
-              <a:ext uri="{FF2B5EF4-FFF2-40B4-BE49-F238E27FC236}">
-                <a16:creationId xmlns="" xmlns:a16="http://schemas.microsoft.com/office/drawing/2014/main" id="{0A49A755-2DCC-4638-8B86-974DCAFE4F52}"/>
-              </a:ext>
-            </a:extLst>
-          </p:cNvPr>
-          <p:cNvPicPr/>
-          <p:nvPr/>
-        </p:nvPicPr>
-        <p:blipFill rotWithShape="1">
-          <a:blip r:embed="rId3"/>
           <a:srcRect t="1581"/>
           <a:stretch/>
         </p:blipFill>
@@ -10013,7 +10282,7 @@
           <p:cNvPr id="9" name="Прямоугольник 8">
             <a:extLst>
               <a:ext uri="{FF2B5EF4-FFF2-40B4-BE49-F238E27FC236}">
-                <a16:creationId xmlns="" xmlns:a16="http://schemas.microsoft.com/office/drawing/2014/main" id="{61DE1EFD-0702-43C4-A9F7-4C4E43565EB9}"/>
+                <a16:creationId xmlns:a16="http://schemas.microsoft.com/office/drawing/2014/main" id="{61DE1EFD-0702-43C4-A9F7-4C4E43565EB9}"/>
               </a:ext>
             </a:extLst>
           </p:cNvPr>
@@ -10067,6 +10336,41 @@
           </a:p>
         </p:txBody>
       </p:sp>
+      <p:pic>
+        <p:nvPicPr>
+          <p:cNvPr id="3" name="Рисунок 2">
+            <a:extLst>
+              <a:ext uri="{FF2B5EF4-FFF2-40B4-BE49-F238E27FC236}">
+                <a16:creationId xmlns:a16="http://schemas.microsoft.com/office/drawing/2014/main" id="{D913917B-A0EE-412E-A117-0A02195688DC}"/>
+              </a:ext>
+            </a:extLst>
+          </p:cNvPr>
+          <p:cNvPicPr>
+            <a:picLocks noChangeAspect="1"/>
+          </p:cNvPicPr>
+          <p:nvPr/>
+        </p:nvPicPr>
+        <p:blipFill>
+          <a:blip r:embed="rId3"/>
+          <a:stretch>
+            <a:fillRect/>
+          </a:stretch>
+        </p:blipFill>
+        <p:spPr>
+          <a:xfrm>
+            <a:off x="540693" y="3005460"/>
+            <a:ext cx="3562697" cy="2932544"/>
+          </a:xfrm>
+          <a:prstGeom prst="rect">
+            <a:avLst/>
+          </a:prstGeom>
+          <a:ln>
+            <a:solidFill>
+              <a:schemeClr val="tx1"/>
+            </a:solidFill>
+          </a:ln>
+        </p:spPr>
+      </p:pic>
     </p:spTree>
     <p:extLst>
       <p:ext uri="{BB962C8B-B14F-4D97-AF65-F5344CB8AC3E}">
@@ -10180,13 +10484,6 @@
   <p:clrMapOvr>
     <a:masterClrMapping/>
   </p:clrMapOvr>
-  <p:timing>
-    <p:tnLst>
-      <p:par>
-        <p:cTn id="1" dur="indefinite" restart="never" nodeType="tmRoot"/>
-      </p:par>
-    </p:tnLst>
-  </p:timing>
 </p:sld>
 </file>
 
@@ -10290,13 +10587,6 @@
   <p:clrMapOvr>
     <a:masterClrMapping/>
   </p:clrMapOvr>
-  <p:timing>
-    <p:tnLst>
-      <p:par>
-        <p:cTn id="1" dur="indefinite" restart="never" nodeType="tmRoot"/>
-      </p:par>
-    </p:tnLst>
-  </p:timing>
 </p:sld>
 </file>
 
@@ -10877,7 +11167,7 @@
   <a:extraClrSchemeLst/>
   <a:extLst>
     <a:ext uri="{05A4C25C-085E-4340-85A3-A5531E510DB2}">
-      <thm15:themeFamily xmlns="" xmlns:thm15="http://schemas.microsoft.com/office/thememl/2012/main" name="Office Theme" id="{62F939B6-93AF-4DB8-9C6B-D6C7DFDC589F}" vid="{4A3C46E8-61CC-4603-A589-7422A47A8E4A}"/>
+      <thm15:themeFamily xmlns:thm15="http://schemas.microsoft.com/office/thememl/2012/main" name="Office Theme" id="{62F939B6-93AF-4DB8-9C6B-D6C7DFDC589F}" vid="{4A3C46E8-61CC-4603-A589-7422A47A8E4A}"/>
     </a:ext>
   </a:extLst>
 </a:theme>

</xml_diff>